<commit_message>
Getting ready for a release.
</commit_message>
<xml_diff>
--- a/documentation/source/figs/images.pptx
+++ b/documentation/source/figs/images.pptx
@@ -6,9 +6,11 @@
   </p:sldMasterIdLst>
   <p:sldIdLst>
     <p:sldId id="282" r:id="rId2"/>
-    <p:sldId id="283" r:id="rId3"/>
-    <p:sldId id="284" r:id="rId4"/>
-    <p:sldId id="285" r:id="rId5"/>
+    <p:sldId id="286" r:id="rId3"/>
+    <p:sldId id="287" r:id="rId4"/>
+    <p:sldId id="283" r:id="rId5"/>
+    <p:sldId id="284" r:id="rId6"/>
+    <p:sldId id="285" r:id="rId7"/>
   </p:sldIdLst>
   <p:sldSz cx="12192000" cy="6858000"/>
   <p:notesSz cx="6858000" cy="9144000"/>
@@ -262,7 +264,7 @@
           <a:p>
             <a:fld id="{326EFC06-FBCA-4C28-84D1-3187E30F45CE}" type="datetimeFigureOut">
               <a:rPr lang="en-US" smtClean="0"/>
-              <a:t>10/19/2022</a:t>
+              <a:t>10/20/2022</a:t>
             </a:fld>
             <a:endParaRPr lang="en-US"/>
           </a:p>
@@ -460,7 +462,7 @@
           <a:p>
             <a:fld id="{326EFC06-FBCA-4C28-84D1-3187E30F45CE}" type="datetimeFigureOut">
               <a:rPr lang="en-US" smtClean="0"/>
-              <a:t>10/19/2022</a:t>
+              <a:t>10/20/2022</a:t>
             </a:fld>
             <a:endParaRPr lang="en-US"/>
           </a:p>
@@ -668,7 +670,7 @@
           <a:p>
             <a:fld id="{326EFC06-FBCA-4C28-84D1-3187E30F45CE}" type="datetimeFigureOut">
               <a:rPr lang="en-US" smtClean="0"/>
-              <a:t>10/19/2022</a:t>
+              <a:t>10/20/2022</a:t>
             </a:fld>
             <a:endParaRPr lang="en-US"/>
           </a:p>
@@ -866,7 +868,7 @@
           <a:p>
             <a:fld id="{326EFC06-FBCA-4C28-84D1-3187E30F45CE}" type="datetimeFigureOut">
               <a:rPr lang="en-US" smtClean="0"/>
-              <a:t>10/19/2022</a:t>
+              <a:t>10/20/2022</a:t>
             </a:fld>
             <a:endParaRPr lang="en-US"/>
           </a:p>
@@ -1141,7 +1143,7 @@
           <a:p>
             <a:fld id="{326EFC06-FBCA-4C28-84D1-3187E30F45CE}" type="datetimeFigureOut">
               <a:rPr lang="en-US" smtClean="0"/>
-              <a:t>10/19/2022</a:t>
+              <a:t>10/20/2022</a:t>
             </a:fld>
             <a:endParaRPr lang="en-US"/>
           </a:p>
@@ -1406,7 +1408,7 @@
           <a:p>
             <a:fld id="{326EFC06-FBCA-4C28-84D1-3187E30F45CE}" type="datetimeFigureOut">
               <a:rPr lang="en-US" smtClean="0"/>
-              <a:t>10/19/2022</a:t>
+              <a:t>10/20/2022</a:t>
             </a:fld>
             <a:endParaRPr lang="en-US"/>
           </a:p>
@@ -1818,7 +1820,7 @@
           <a:p>
             <a:fld id="{326EFC06-FBCA-4C28-84D1-3187E30F45CE}" type="datetimeFigureOut">
               <a:rPr lang="en-US" smtClean="0"/>
-              <a:t>10/19/2022</a:t>
+              <a:t>10/20/2022</a:t>
             </a:fld>
             <a:endParaRPr lang="en-US"/>
           </a:p>
@@ -1959,7 +1961,7 @@
           <a:p>
             <a:fld id="{326EFC06-FBCA-4C28-84D1-3187E30F45CE}" type="datetimeFigureOut">
               <a:rPr lang="en-US" smtClean="0"/>
-              <a:t>10/19/2022</a:t>
+              <a:t>10/20/2022</a:t>
             </a:fld>
             <a:endParaRPr lang="en-US"/>
           </a:p>
@@ -2072,7 +2074,7 @@
           <a:p>
             <a:fld id="{326EFC06-FBCA-4C28-84D1-3187E30F45CE}" type="datetimeFigureOut">
               <a:rPr lang="en-US" smtClean="0"/>
-              <a:t>10/19/2022</a:t>
+              <a:t>10/20/2022</a:t>
             </a:fld>
             <a:endParaRPr lang="en-US"/>
           </a:p>
@@ -2383,7 +2385,7 @@
           <a:p>
             <a:fld id="{326EFC06-FBCA-4C28-84D1-3187E30F45CE}" type="datetimeFigureOut">
               <a:rPr lang="en-US" smtClean="0"/>
-              <a:t>10/19/2022</a:t>
+              <a:t>10/20/2022</a:t>
             </a:fld>
             <a:endParaRPr lang="en-US"/>
           </a:p>
@@ -2671,7 +2673,7 @@
           <a:p>
             <a:fld id="{326EFC06-FBCA-4C28-84D1-3187E30F45CE}" type="datetimeFigureOut">
               <a:rPr lang="en-US" smtClean="0"/>
-              <a:t>10/19/2022</a:t>
+              <a:t>10/20/2022</a:t>
             </a:fld>
             <a:endParaRPr lang="en-US"/>
           </a:p>
@@ -2912,7 +2914,7 @@
           <a:p>
             <a:fld id="{326EFC06-FBCA-4C28-84D1-3187E30F45CE}" type="datetimeFigureOut">
               <a:rPr lang="en-US" smtClean="0"/>
-              <a:t>10/19/2022</a:t>
+              <a:t>10/20/2022</a:t>
             </a:fld>
             <a:endParaRPr lang="en-US"/>
           </a:p>
@@ -4555,6 +4557,2612 @@
 </file>
 
 <file path=ppt/slides/slide2.xml><?xml version="1.0" encoding="utf-8"?>
+<p:sld xmlns:a="http://schemas.openxmlformats.org/drawingml/2006/main" xmlns:r="http://schemas.openxmlformats.org/officeDocument/2006/relationships" xmlns:p="http://schemas.openxmlformats.org/presentationml/2006/main">
+  <p:cSld>
+    <p:spTree>
+      <p:nvGrpSpPr>
+        <p:cNvPr id="1" name=""/>
+        <p:cNvGrpSpPr/>
+        <p:nvPr/>
+      </p:nvGrpSpPr>
+      <p:grpSpPr>
+        <a:xfrm>
+          <a:off x="0" y="0"/>
+          <a:ext cx="0" cy="0"/>
+          <a:chOff x="0" y="0"/>
+          <a:chExt cx="0" cy="0"/>
+        </a:xfrm>
+      </p:grpSpPr>
+      <mc:AlternateContent xmlns:mc="http://schemas.openxmlformats.org/markup-compatibility/2006">
+        <mc:Choice xmlns:a14="http://schemas.microsoft.com/office/drawing/2010/main" Requires="a14">
+          <p:sp>
+            <p:nvSpPr>
+              <p:cNvPr id="3" name="Rectangle 2">
+                <a:extLst>
+                  <a:ext uri="{FF2B5EF4-FFF2-40B4-BE49-F238E27FC236}">
+                    <a16:creationId xmlns:a16="http://schemas.microsoft.com/office/drawing/2014/main" id="{81697CEE-E40C-8AF1-39F1-8792A7BBBEC3}"/>
+                  </a:ext>
+                </a:extLst>
+              </p:cNvPr>
+              <p:cNvSpPr/>
+              <p:nvPr/>
+            </p:nvSpPr>
+            <p:spPr>
+              <a:xfrm>
+                <a:off x="2252869" y="1798155"/>
+                <a:ext cx="1908313" cy="1060174"/>
+              </a:xfrm>
+              <a:prstGeom prst="rect">
+                <a:avLst/>
+              </a:prstGeom>
+              <a:noFill/>
+              <a:ln w="28575">
+                <a:solidFill>
+                  <a:schemeClr val="tx1"/>
+                </a:solidFill>
+              </a:ln>
+            </p:spPr>
+            <p:style>
+              <a:lnRef idx="2">
+                <a:schemeClr val="accent1">
+                  <a:shade val="50000"/>
+                </a:schemeClr>
+              </a:lnRef>
+              <a:fillRef idx="1">
+                <a:schemeClr val="accent1"/>
+              </a:fillRef>
+              <a:effectRef idx="0">
+                <a:schemeClr val="accent1"/>
+              </a:effectRef>
+              <a:fontRef idx="minor">
+                <a:schemeClr val="lt1"/>
+              </a:fontRef>
+            </p:style>
+            <p:txBody>
+              <a:bodyPr rtlCol="0" anchor="ctr"/>
+              <a:lstStyle/>
+              <a:p>
+                <a:pPr algn="ctr"/>
+                <a14:m>
+                  <m:oMathPara xmlns:m="http://schemas.openxmlformats.org/officeDocument/2006/math">
+                    <m:oMathParaPr>
+                      <m:jc m:val="centerGroup"/>
+                    </m:oMathParaPr>
+                    <m:oMath xmlns:m="http://schemas.openxmlformats.org/officeDocument/2006/math">
+                      <m:sSub>
+                        <m:sSubPr>
+                          <m:ctrlPr>
+                            <a:rPr lang="en-US" sz="2000" b="0" i="1" smtClean="0">
+                              <a:solidFill>
+                                <a:schemeClr val="tx1"/>
+                              </a:solidFill>
+                              <a:latin typeface="Cambria Math" panose="02040503050406030204" pitchFamily="18" charset="0"/>
+                            </a:rPr>
+                          </m:ctrlPr>
+                        </m:sSubPr>
+                        <m:e>
+                          <m:r>
+                            <a:rPr lang="en-US" sz="2000" b="0" i="1" smtClean="0">
+                              <a:solidFill>
+                                <a:schemeClr val="tx1"/>
+                              </a:solidFill>
+                              <a:latin typeface="Cambria Math" panose="02040503050406030204" pitchFamily="18" charset="0"/>
+                            </a:rPr>
+                            <m:t>𝑀</m:t>
+                          </m:r>
+                        </m:e>
+                        <m:sub>
+                          <m:r>
+                            <a:rPr lang="en-US" sz="2000" b="0" i="1" smtClean="0">
+                              <a:solidFill>
+                                <a:schemeClr val="tx1"/>
+                              </a:solidFill>
+                              <a:latin typeface="Cambria Math" panose="02040503050406030204" pitchFamily="18" charset="0"/>
+                            </a:rPr>
+                            <m:t>1</m:t>
+                          </m:r>
+                        </m:sub>
+                      </m:sSub>
+                      <m:r>
+                        <a:rPr lang="en-US" sz="2000" b="0" i="1" smtClean="0">
+                          <a:solidFill>
+                            <a:schemeClr val="tx1"/>
+                          </a:solidFill>
+                          <a:latin typeface="Cambria Math" panose="02040503050406030204" pitchFamily="18" charset="0"/>
+                        </a:rPr>
+                        <m:t>⊨</m:t>
+                      </m:r>
+                      <m:sSub>
+                        <m:sSubPr>
+                          <m:ctrlPr>
+                            <a:rPr lang="en-US" sz="2000" b="0" i="1" smtClean="0">
+                              <a:solidFill>
+                                <a:schemeClr val="tx1"/>
+                              </a:solidFill>
+                              <a:latin typeface="Cambria Math" panose="02040503050406030204" pitchFamily="18" charset="0"/>
+                            </a:rPr>
+                          </m:ctrlPr>
+                        </m:sSubPr>
+                        <m:e>
+                          <m:r>
+                            <a:rPr lang="en-US" sz="2000" b="0" i="1" smtClean="0">
+                              <a:solidFill>
+                                <a:schemeClr val="tx1"/>
+                              </a:solidFill>
+                              <a:latin typeface="Cambria Math" panose="02040503050406030204" pitchFamily="18" charset="0"/>
+                            </a:rPr>
+                            <m:t>𝐶</m:t>
+                          </m:r>
+                        </m:e>
+                        <m:sub>
+                          <m:r>
+                            <a:rPr lang="en-US" sz="2000" b="0" i="1" smtClean="0">
+                              <a:solidFill>
+                                <a:schemeClr val="tx1"/>
+                              </a:solidFill>
+                              <a:latin typeface="Cambria Math" panose="02040503050406030204" pitchFamily="18" charset="0"/>
+                            </a:rPr>
+                            <m:t>1</m:t>
+                          </m:r>
+                        </m:sub>
+                      </m:sSub>
+                      <m:d>
+                        <m:dPr>
+                          <m:ctrlPr>
+                            <a:rPr lang="en-US" sz="2000" b="0" i="1" smtClean="0">
+                              <a:solidFill>
+                                <a:schemeClr val="tx1"/>
+                              </a:solidFill>
+                              <a:latin typeface="Cambria Math" panose="02040503050406030204" pitchFamily="18" charset="0"/>
+                            </a:rPr>
+                          </m:ctrlPr>
+                        </m:dPr>
+                        <m:e>
+                          <m:r>
+                            <a:rPr lang="en-US" sz="2000" b="0" i="1" smtClean="0">
+                              <a:solidFill>
+                                <a:schemeClr val="tx1"/>
+                              </a:solidFill>
+                              <a:latin typeface="Cambria Math" panose="02040503050406030204" pitchFamily="18" charset="0"/>
+                            </a:rPr>
+                            <m:t>𝑝</m:t>
+                          </m:r>
+                          <m:r>
+                            <a:rPr lang="en-US" sz="2000" b="0" i="1" smtClean="0">
+                              <a:solidFill>
+                                <a:schemeClr val="tx1"/>
+                              </a:solidFill>
+                              <a:latin typeface="Cambria Math" panose="02040503050406030204" pitchFamily="18" charset="0"/>
+                            </a:rPr>
+                            <m:t>,</m:t>
+                          </m:r>
+                          <m:r>
+                            <a:rPr lang="en-US" sz="2000" b="0" i="1" smtClean="0">
+                              <a:solidFill>
+                                <a:schemeClr val="tx1"/>
+                              </a:solidFill>
+                              <a:latin typeface="Cambria Math" panose="02040503050406030204" pitchFamily="18" charset="0"/>
+                            </a:rPr>
+                            <m:t>𝑐</m:t>
+                          </m:r>
+                        </m:e>
+                      </m:d>
+                    </m:oMath>
+                  </m:oMathPara>
+                </a14:m>
+                <a:endParaRPr lang="en-US" sz="2000" dirty="0"/>
+              </a:p>
+            </p:txBody>
+          </p:sp>
+        </mc:Choice>
+        <mc:Fallback>
+          <p:sp>
+            <p:nvSpPr>
+              <p:cNvPr id="3" name="Rectangle 2">
+                <a:extLst>
+                  <a:ext uri="{FF2B5EF4-FFF2-40B4-BE49-F238E27FC236}">
+                    <a16:creationId xmlns:a16="http://schemas.microsoft.com/office/drawing/2014/main" id="{81697CEE-E40C-8AF1-39F1-8792A7BBBEC3}"/>
+                  </a:ext>
+                </a:extLst>
+              </p:cNvPr>
+              <p:cNvSpPr>
+                <a:spLocks noRot="1" noChangeAspect="1" noMove="1" noResize="1" noEditPoints="1" noAdjustHandles="1" noChangeArrowheads="1" noChangeShapeType="1" noTextEdit="1"/>
+              </p:cNvSpPr>
+              <p:nvPr/>
+            </p:nvSpPr>
+            <p:spPr>
+              <a:xfrm>
+                <a:off x="2252869" y="1798155"/>
+                <a:ext cx="1908313" cy="1060174"/>
+              </a:xfrm>
+              <a:prstGeom prst="rect">
+                <a:avLst/>
+              </a:prstGeom>
+              <a:blipFill>
+                <a:blip r:embed="rId2"/>
+                <a:stretch>
+                  <a:fillRect/>
+                </a:stretch>
+              </a:blipFill>
+              <a:ln w="28575">
+                <a:solidFill>
+                  <a:schemeClr val="tx1"/>
+                </a:solidFill>
+              </a:ln>
+            </p:spPr>
+            <p:txBody>
+              <a:bodyPr/>
+              <a:lstStyle/>
+              <a:p>
+                <a:r>
+                  <a:rPr lang="en-US">
+                    <a:noFill/>
+                  </a:rPr>
+                  <a:t> </a:t>
+                </a:r>
+              </a:p>
+            </p:txBody>
+          </p:sp>
+        </mc:Fallback>
+      </mc:AlternateContent>
+      <p:cxnSp>
+        <p:nvCxnSpPr>
+          <p:cNvPr id="7" name="Straight Arrow Connector 6">
+            <a:extLst>
+              <a:ext uri="{FF2B5EF4-FFF2-40B4-BE49-F238E27FC236}">
+                <a16:creationId xmlns:a16="http://schemas.microsoft.com/office/drawing/2014/main" id="{8276139F-8C68-CEC8-010E-25C8C8E48C3E}"/>
+              </a:ext>
+            </a:extLst>
+          </p:cNvPr>
+          <p:cNvCxnSpPr>
+            <a:cxnSpLocks/>
+            <a:stCxn id="3" idx="3"/>
+          </p:cNvCxnSpPr>
+          <p:nvPr/>
+        </p:nvCxnSpPr>
+        <p:spPr>
+          <a:xfrm>
+            <a:off x="4161182" y="2328242"/>
+            <a:ext cx="1245704" cy="0"/>
+          </a:xfrm>
+          <a:prstGeom prst="straightConnector1">
+            <a:avLst/>
+          </a:prstGeom>
+          <a:ln>
+            <a:solidFill>
+              <a:schemeClr val="tx1"/>
+            </a:solidFill>
+            <a:tailEnd type="triangle"/>
+          </a:ln>
+        </p:spPr>
+        <p:style>
+          <a:lnRef idx="1">
+            <a:schemeClr val="accent1"/>
+          </a:lnRef>
+          <a:fillRef idx="0">
+            <a:schemeClr val="accent1"/>
+          </a:fillRef>
+          <a:effectRef idx="0">
+            <a:schemeClr val="accent1"/>
+          </a:effectRef>
+          <a:fontRef idx="minor">
+            <a:schemeClr val="tx1"/>
+          </a:fontRef>
+        </p:style>
+      </p:cxnSp>
+      <mc:AlternateContent xmlns:mc="http://schemas.openxmlformats.org/markup-compatibility/2006">
+        <mc:Choice xmlns:a14="http://schemas.microsoft.com/office/drawing/2010/main" Requires="a14">
+          <p:sp>
+            <p:nvSpPr>
+              <p:cNvPr id="11" name="TextBox 10">
+                <a:extLst>
+                  <a:ext uri="{FF2B5EF4-FFF2-40B4-BE49-F238E27FC236}">
+                    <a16:creationId xmlns:a16="http://schemas.microsoft.com/office/drawing/2014/main" id="{0CF76764-698E-B5B3-EC2C-6914FA54D6BC}"/>
+                  </a:ext>
+                </a:extLst>
+              </p:cNvPr>
+              <p:cNvSpPr txBox="1"/>
+              <p:nvPr/>
+            </p:nvSpPr>
+            <p:spPr>
+              <a:xfrm>
+                <a:off x="4472608" y="1798155"/>
+                <a:ext cx="622852" cy="461665"/>
+              </a:xfrm>
+              <a:prstGeom prst="rect">
+                <a:avLst/>
+              </a:prstGeom>
+              <a:noFill/>
+            </p:spPr>
+            <p:txBody>
+              <a:bodyPr wrap="square">
+                <a:spAutoFit/>
+              </a:bodyPr>
+              <a:lstStyle/>
+              <a:p>
+                <a:pPr/>
+                <a14:m>
+                  <m:oMathPara xmlns:m="http://schemas.openxmlformats.org/officeDocument/2006/math">
+                    <m:oMathParaPr>
+                      <m:jc m:val="centerGroup"/>
+                    </m:oMathParaPr>
+                    <m:oMath xmlns:m="http://schemas.openxmlformats.org/officeDocument/2006/math">
+                      <m:r>
+                        <a:rPr lang="en-US" sz="2400" b="0" i="1" smtClean="0">
+                          <a:solidFill>
+                            <a:schemeClr val="tx1"/>
+                          </a:solidFill>
+                          <a:latin typeface="Cambria Math" panose="02040503050406030204" pitchFamily="18" charset="0"/>
+                        </a:rPr>
+                        <m:t>𝑢</m:t>
+                      </m:r>
+                    </m:oMath>
+                  </m:oMathPara>
+                </a14:m>
+                <a:endParaRPr lang="en-US" sz="2400" dirty="0"/>
+              </a:p>
+            </p:txBody>
+          </p:sp>
+        </mc:Choice>
+        <mc:Fallback>
+          <p:sp>
+            <p:nvSpPr>
+              <p:cNvPr id="11" name="TextBox 10">
+                <a:extLst>
+                  <a:ext uri="{FF2B5EF4-FFF2-40B4-BE49-F238E27FC236}">
+                    <a16:creationId xmlns:a16="http://schemas.microsoft.com/office/drawing/2014/main" id="{0CF76764-698E-B5B3-EC2C-6914FA54D6BC}"/>
+                  </a:ext>
+                </a:extLst>
+              </p:cNvPr>
+              <p:cNvSpPr txBox="1">
+                <a:spLocks noRot="1" noChangeAspect="1" noMove="1" noResize="1" noEditPoints="1" noAdjustHandles="1" noChangeArrowheads="1" noChangeShapeType="1" noTextEdit="1"/>
+              </p:cNvSpPr>
+              <p:nvPr/>
+            </p:nvSpPr>
+            <p:spPr>
+              <a:xfrm>
+                <a:off x="4472608" y="1798155"/>
+                <a:ext cx="622852" cy="461665"/>
+              </a:xfrm>
+              <a:prstGeom prst="rect">
+                <a:avLst/>
+              </a:prstGeom>
+              <a:blipFill>
+                <a:blip r:embed="rId3"/>
+                <a:stretch>
+                  <a:fillRect/>
+                </a:stretch>
+              </a:blipFill>
+            </p:spPr>
+            <p:txBody>
+              <a:bodyPr/>
+              <a:lstStyle/>
+              <a:p>
+                <a:r>
+                  <a:rPr lang="en-US">
+                    <a:noFill/>
+                  </a:rPr>
+                  <a:t> </a:t>
+                </a:r>
+              </a:p>
+            </p:txBody>
+          </p:sp>
+        </mc:Fallback>
+      </mc:AlternateContent>
+      <mc:AlternateContent xmlns:mc="http://schemas.openxmlformats.org/markup-compatibility/2006">
+        <mc:Choice xmlns:a14="http://schemas.microsoft.com/office/drawing/2010/main" Requires="a14">
+          <p:sp>
+            <p:nvSpPr>
+              <p:cNvPr id="12" name="Rectangle 11">
+                <a:extLst>
+                  <a:ext uri="{FF2B5EF4-FFF2-40B4-BE49-F238E27FC236}">
+                    <a16:creationId xmlns:a16="http://schemas.microsoft.com/office/drawing/2014/main" id="{437991F8-4164-812F-66F6-C8E5155688BD}"/>
+                  </a:ext>
+                </a:extLst>
+              </p:cNvPr>
+              <p:cNvSpPr/>
+              <p:nvPr/>
+            </p:nvSpPr>
+            <p:spPr>
+              <a:xfrm>
+                <a:off x="7060509" y="3858454"/>
+                <a:ext cx="1908313" cy="1060174"/>
+              </a:xfrm>
+              <a:prstGeom prst="rect">
+                <a:avLst/>
+              </a:prstGeom>
+              <a:noFill/>
+              <a:ln w="28575">
+                <a:solidFill>
+                  <a:schemeClr val="tx1"/>
+                </a:solidFill>
+              </a:ln>
+            </p:spPr>
+            <p:style>
+              <a:lnRef idx="2">
+                <a:schemeClr val="accent1">
+                  <a:shade val="50000"/>
+                </a:schemeClr>
+              </a:lnRef>
+              <a:fillRef idx="1">
+                <a:schemeClr val="accent1"/>
+              </a:fillRef>
+              <a:effectRef idx="0">
+                <a:schemeClr val="accent1"/>
+              </a:effectRef>
+              <a:fontRef idx="minor">
+                <a:schemeClr val="lt1"/>
+              </a:fontRef>
+            </p:style>
+            <p:txBody>
+              <a:bodyPr rtlCol="0" anchor="ctr"/>
+              <a:lstStyle/>
+              <a:p>
+                <a:pPr algn="ctr"/>
+                <a14:m>
+                  <m:oMathPara xmlns:m="http://schemas.openxmlformats.org/officeDocument/2006/math">
+                    <m:oMathParaPr>
+                      <m:jc m:val="centerGroup"/>
+                    </m:oMathParaPr>
+                    <m:oMath xmlns:m="http://schemas.openxmlformats.org/officeDocument/2006/math">
+                      <m:sSub>
+                        <m:sSubPr>
+                          <m:ctrlPr>
+                            <a:rPr lang="en-US" sz="2000" i="1" smtClean="0">
+                              <a:solidFill>
+                                <a:schemeClr val="tx1"/>
+                              </a:solidFill>
+                              <a:latin typeface="Cambria Math" panose="02040503050406030204" pitchFamily="18" charset="0"/>
+                            </a:rPr>
+                          </m:ctrlPr>
+                        </m:sSubPr>
+                        <m:e>
+                          <m:r>
+                            <a:rPr lang="en-US" sz="2000" i="1">
+                              <a:solidFill>
+                                <a:schemeClr val="tx1"/>
+                              </a:solidFill>
+                              <a:latin typeface="Cambria Math" panose="02040503050406030204" pitchFamily="18" charset="0"/>
+                            </a:rPr>
+                            <m:t>𝑀</m:t>
+                          </m:r>
+                        </m:e>
+                        <m:sub>
+                          <m:r>
+                            <a:rPr lang="en-US" sz="2000" b="0" i="1" smtClean="0">
+                              <a:solidFill>
+                                <a:schemeClr val="tx1"/>
+                              </a:solidFill>
+                              <a:latin typeface="Cambria Math" panose="02040503050406030204" pitchFamily="18" charset="0"/>
+                            </a:rPr>
+                            <m:t>2</m:t>
+                          </m:r>
+                        </m:sub>
+                      </m:sSub>
+                      <m:d>
+                        <m:dPr>
+                          <m:ctrlPr>
+                            <a:rPr lang="en-US" sz="2000" i="1">
+                              <a:solidFill>
+                                <a:schemeClr val="tx1"/>
+                              </a:solidFill>
+                              <a:latin typeface="Cambria Math" panose="02040503050406030204" pitchFamily="18" charset="0"/>
+                            </a:rPr>
+                          </m:ctrlPr>
+                        </m:dPr>
+                        <m:e>
+                          <m:sSub>
+                            <m:sSubPr>
+                              <m:ctrlPr>
+                                <a:rPr lang="en-US" sz="2000" i="1">
+                                  <a:solidFill>
+                                    <a:schemeClr val="tx1"/>
+                                  </a:solidFill>
+                                  <a:latin typeface="Cambria Math" panose="02040503050406030204" pitchFamily="18" charset="0"/>
+                                </a:rPr>
+                              </m:ctrlPr>
+                            </m:sSubPr>
+                            <m:e>
+                              <m:r>
+                                <a:rPr lang="en-US" sz="2000" i="1">
+                                  <a:solidFill>
+                                    <a:schemeClr val="tx1"/>
+                                  </a:solidFill>
+                                  <a:latin typeface="Cambria Math" panose="02040503050406030204" pitchFamily="18" charset="0"/>
+                                </a:rPr>
+                                <m:t>𝜋</m:t>
+                              </m:r>
+                            </m:e>
+                            <m:sub>
+                              <m:r>
+                                <a:rPr lang="en-US" sz="2000" b="0" i="1" smtClean="0">
+                                  <a:solidFill>
+                                    <a:schemeClr val="tx1"/>
+                                  </a:solidFill>
+                                  <a:latin typeface="Cambria Math" panose="02040503050406030204" pitchFamily="18" charset="0"/>
+                                </a:rPr>
+                                <m:t>𝑀</m:t>
+                              </m:r>
+                            </m:sub>
+                          </m:sSub>
+                        </m:e>
+                      </m:d>
+                      <m:r>
+                        <a:rPr lang="en-US" sz="2000" i="1">
+                          <a:solidFill>
+                            <a:schemeClr val="tx1"/>
+                          </a:solidFill>
+                          <a:latin typeface="Cambria Math" panose="02040503050406030204" pitchFamily="18" charset="0"/>
+                        </a:rPr>
+                        <m:t>⊨</m:t>
+                      </m:r>
+                      <m:sSub>
+                        <m:sSubPr>
+                          <m:ctrlPr>
+                            <a:rPr lang="en-US" sz="2000" i="1">
+                              <a:solidFill>
+                                <a:schemeClr val="tx1"/>
+                              </a:solidFill>
+                              <a:latin typeface="Cambria Math" panose="02040503050406030204" pitchFamily="18" charset="0"/>
+                            </a:rPr>
+                          </m:ctrlPr>
+                        </m:sSubPr>
+                        <m:e>
+                          <m:r>
+                            <a:rPr lang="en-US" sz="2000" i="1">
+                              <a:solidFill>
+                                <a:schemeClr val="tx1"/>
+                              </a:solidFill>
+                              <a:latin typeface="Cambria Math" panose="02040503050406030204" pitchFamily="18" charset="0"/>
+                            </a:rPr>
+                            <m:t>𝐶</m:t>
+                          </m:r>
+                        </m:e>
+                        <m:sub>
+                          <m:r>
+                            <a:rPr lang="en-US" sz="2000" b="0" i="1" smtClean="0">
+                              <a:solidFill>
+                                <a:schemeClr val="tx1"/>
+                              </a:solidFill>
+                              <a:latin typeface="Cambria Math" panose="02040503050406030204" pitchFamily="18" charset="0"/>
+                            </a:rPr>
+                            <m:t>2</m:t>
+                          </m:r>
+                        </m:sub>
+                      </m:sSub>
+                    </m:oMath>
+                  </m:oMathPara>
+                </a14:m>
+                <a:endParaRPr lang="en-US" sz="2000" dirty="0"/>
+              </a:p>
+            </p:txBody>
+          </p:sp>
+        </mc:Choice>
+        <mc:Fallback>
+          <p:sp>
+            <p:nvSpPr>
+              <p:cNvPr id="12" name="Rectangle 11">
+                <a:extLst>
+                  <a:ext uri="{FF2B5EF4-FFF2-40B4-BE49-F238E27FC236}">
+                    <a16:creationId xmlns:a16="http://schemas.microsoft.com/office/drawing/2014/main" id="{437991F8-4164-812F-66F6-C8E5155688BD}"/>
+                  </a:ext>
+                </a:extLst>
+              </p:cNvPr>
+              <p:cNvSpPr>
+                <a:spLocks noRot="1" noChangeAspect="1" noMove="1" noResize="1" noEditPoints="1" noAdjustHandles="1" noChangeArrowheads="1" noChangeShapeType="1" noTextEdit="1"/>
+              </p:cNvSpPr>
+              <p:nvPr/>
+            </p:nvSpPr>
+            <p:spPr>
+              <a:xfrm>
+                <a:off x="7060509" y="3858454"/>
+                <a:ext cx="1908313" cy="1060174"/>
+              </a:xfrm>
+              <a:prstGeom prst="rect">
+                <a:avLst/>
+              </a:prstGeom>
+              <a:blipFill>
+                <a:blip r:embed="rId4"/>
+                <a:stretch>
+                  <a:fillRect/>
+                </a:stretch>
+              </a:blipFill>
+              <a:ln w="28575">
+                <a:solidFill>
+                  <a:schemeClr val="tx1"/>
+                </a:solidFill>
+              </a:ln>
+            </p:spPr>
+            <p:txBody>
+              <a:bodyPr/>
+              <a:lstStyle/>
+              <a:p>
+                <a:r>
+                  <a:rPr lang="en-US">
+                    <a:noFill/>
+                  </a:rPr>
+                  <a:t> </a:t>
+                </a:r>
+              </a:p>
+            </p:txBody>
+          </p:sp>
+        </mc:Fallback>
+      </mc:AlternateContent>
+      <mc:AlternateContent xmlns:mc="http://schemas.openxmlformats.org/markup-compatibility/2006">
+        <mc:Choice xmlns:a14="http://schemas.microsoft.com/office/drawing/2010/main" Requires="a14">
+          <p:sp>
+            <p:nvSpPr>
+              <p:cNvPr id="17" name="TextBox 16">
+                <a:extLst>
+                  <a:ext uri="{FF2B5EF4-FFF2-40B4-BE49-F238E27FC236}">
+                    <a16:creationId xmlns:a16="http://schemas.microsoft.com/office/drawing/2014/main" id="{0560F027-104C-8145-F946-B79063A70BEA}"/>
+                  </a:ext>
+                </a:extLst>
+              </p:cNvPr>
+              <p:cNvSpPr txBox="1"/>
+              <p:nvPr/>
+            </p:nvSpPr>
+            <p:spPr>
+              <a:xfrm>
+                <a:off x="5383575" y="2977240"/>
+                <a:ext cx="5262180" cy="461665"/>
+              </a:xfrm>
+              <a:prstGeom prst="rect">
+                <a:avLst/>
+              </a:prstGeom>
+              <a:noFill/>
+            </p:spPr>
+            <p:txBody>
+              <a:bodyPr wrap="square">
+                <a:spAutoFit/>
+              </a:bodyPr>
+              <a:lstStyle/>
+              <a:p>
+                <a:pPr/>
+                <a14:m>
+                  <m:oMathPara xmlns:m="http://schemas.openxmlformats.org/officeDocument/2006/math">
+                    <m:oMathParaPr>
+                      <m:jc m:val="centerGroup"/>
+                    </m:oMathParaPr>
+                    <m:oMath xmlns:m="http://schemas.openxmlformats.org/officeDocument/2006/math">
+                      <m:r>
+                        <a:rPr lang="en-US" sz="2400" i="1" smtClean="0">
+                          <a:latin typeface="Cambria Math" panose="02040503050406030204" pitchFamily="18" charset="0"/>
+                        </a:rPr>
+                        <m:t>𝑤</m:t>
+                      </m:r>
+                      <m:r>
+                        <a:rPr lang="en-US" sz="2400" i="1" smtClean="0">
+                          <a:latin typeface="Cambria Math" panose="02040503050406030204" pitchFamily="18" charset="0"/>
+                        </a:rPr>
+                        <m:t>~</m:t>
+                      </m:r>
+                      <m:r>
+                        <a:rPr lang="en-US" sz="2400" i="1" smtClean="0">
+                          <a:latin typeface="Cambria Math" panose="02040503050406030204" pitchFamily="18" charset="0"/>
+                        </a:rPr>
+                        <m:t>𝐺𝑎𝑢𝑠𝑠𝑖𝑎𝑛</m:t>
+                      </m:r>
+                      <m:r>
+                        <a:rPr lang="en-US" sz="2400" i="1" smtClean="0">
+                          <a:latin typeface="Cambria Math" panose="02040503050406030204" pitchFamily="18" charset="0"/>
+                        </a:rPr>
+                        <m:t> </m:t>
+                      </m:r>
+                      <m:d>
+                        <m:dPr>
+                          <m:ctrlPr>
+                            <a:rPr lang="en-US" sz="2400" i="1">
+                              <a:latin typeface="Cambria Math" panose="02040503050406030204" pitchFamily="18" charset="0"/>
+                            </a:rPr>
+                          </m:ctrlPr>
+                        </m:dPr>
+                        <m:e>
+                          <m:sSup>
+                            <m:sSupPr>
+                              <m:ctrlPr>
+                                <a:rPr lang="en-US" sz="2400" i="1">
+                                  <a:latin typeface="Cambria Math" panose="02040503050406030204" pitchFamily="18" charset="0"/>
+                                </a:rPr>
+                              </m:ctrlPr>
+                            </m:sSupPr>
+                            <m:e>
+                              <m:r>
+                                <a:rPr lang="en-US" sz="2400" b="0" i="1" smtClean="0">
+                                  <a:latin typeface="Cambria Math" panose="02040503050406030204" pitchFamily="18" charset="0"/>
+                                </a:rPr>
+                                <m:t>𝜇</m:t>
+                              </m:r>
+                              <m:r>
+                                <a:rPr lang="en-US" sz="2400" i="1">
+                                  <a:latin typeface="Cambria Math" panose="02040503050406030204" pitchFamily="18" charset="0"/>
+                                </a:rPr>
+                                <m:t>,</m:t>
+                              </m:r>
+                              <m:r>
+                                <a:rPr lang="en-US" sz="2400" b="0" i="1" smtClean="0">
+                                  <a:latin typeface="Cambria Math" panose="02040503050406030204" pitchFamily="18" charset="0"/>
+                                </a:rPr>
+                                <m:t>𝜎</m:t>
+                              </m:r>
+                            </m:e>
+                            <m:sup>
+                              <m:r>
+                                <a:rPr lang="en-US" sz="2400" i="1">
+                                  <a:latin typeface="Cambria Math" panose="02040503050406030204" pitchFamily="18" charset="0"/>
+                                </a:rPr>
+                                <m:t>2</m:t>
+                              </m:r>
+                            </m:sup>
+                          </m:sSup>
+                        </m:e>
+                      </m:d>
+                    </m:oMath>
+                  </m:oMathPara>
+                </a14:m>
+                <a:endParaRPr lang="en-US" sz="2400" dirty="0"/>
+              </a:p>
+            </p:txBody>
+          </p:sp>
+        </mc:Choice>
+        <mc:Fallback>
+          <p:sp>
+            <p:nvSpPr>
+              <p:cNvPr id="17" name="TextBox 16">
+                <a:extLst>
+                  <a:ext uri="{FF2B5EF4-FFF2-40B4-BE49-F238E27FC236}">
+                    <a16:creationId xmlns:a16="http://schemas.microsoft.com/office/drawing/2014/main" id="{0560F027-104C-8145-F946-B79063A70BEA}"/>
+                  </a:ext>
+                </a:extLst>
+              </p:cNvPr>
+              <p:cNvSpPr txBox="1">
+                <a:spLocks noRot="1" noChangeAspect="1" noMove="1" noResize="1" noEditPoints="1" noAdjustHandles="1" noChangeArrowheads="1" noChangeShapeType="1" noTextEdit="1"/>
+              </p:cNvSpPr>
+              <p:nvPr/>
+            </p:nvSpPr>
+            <p:spPr>
+              <a:xfrm>
+                <a:off x="5383575" y="2977240"/>
+                <a:ext cx="5262180" cy="461665"/>
+              </a:xfrm>
+              <a:prstGeom prst="rect">
+                <a:avLst/>
+              </a:prstGeom>
+              <a:blipFill>
+                <a:blip r:embed="rId5"/>
+                <a:stretch>
+                  <a:fillRect b="-7895"/>
+                </a:stretch>
+              </a:blipFill>
+            </p:spPr>
+            <p:txBody>
+              <a:bodyPr/>
+              <a:lstStyle/>
+              <a:p>
+                <a:r>
+                  <a:rPr lang="en-US">
+                    <a:noFill/>
+                  </a:rPr>
+                  <a:t> </a:t>
+                </a:r>
+              </a:p>
+            </p:txBody>
+          </p:sp>
+        </mc:Fallback>
+      </mc:AlternateContent>
+      <p:cxnSp>
+        <p:nvCxnSpPr>
+          <p:cNvPr id="18" name="Straight Arrow Connector 17">
+            <a:extLst>
+              <a:ext uri="{FF2B5EF4-FFF2-40B4-BE49-F238E27FC236}">
+                <a16:creationId xmlns:a16="http://schemas.microsoft.com/office/drawing/2014/main" id="{0C310376-5EA1-7696-6E27-B7800D712F8B}"/>
+              </a:ext>
+            </a:extLst>
+          </p:cNvPr>
+          <p:cNvCxnSpPr>
+            <a:cxnSpLocks/>
+            <a:stCxn id="17" idx="2"/>
+            <a:endCxn id="12" idx="0"/>
+          </p:cNvCxnSpPr>
+          <p:nvPr/>
+        </p:nvCxnSpPr>
+        <p:spPr>
+          <a:xfrm>
+            <a:off x="8014665" y="3438905"/>
+            <a:ext cx="1" cy="419549"/>
+          </a:xfrm>
+          <a:prstGeom prst="straightConnector1">
+            <a:avLst/>
+          </a:prstGeom>
+          <a:ln>
+            <a:solidFill>
+              <a:schemeClr val="tx1"/>
+            </a:solidFill>
+            <a:prstDash val="lgDash"/>
+            <a:tailEnd type="triangle"/>
+          </a:ln>
+        </p:spPr>
+        <p:style>
+          <a:lnRef idx="1">
+            <a:schemeClr val="accent1"/>
+          </a:lnRef>
+          <a:fillRef idx="0">
+            <a:schemeClr val="accent1"/>
+          </a:fillRef>
+          <a:effectRef idx="0">
+            <a:schemeClr val="accent1"/>
+          </a:effectRef>
+          <a:fontRef idx="minor">
+            <a:schemeClr val="tx1"/>
+          </a:fontRef>
+        </p:style>
+      </p:cxnSp>
+      <mc:AlternateContent xmlns:mc="http://schemas.openxmlformats.org/markup-compatibility/2006">
+        <mc:Choice xmlns:a14="http://schemas.microsoft.com/office/drawing/2010/main" Requires="a14">
+          <p:sp>
+            <p:nvSpPr>
+              <p:cNvPr id="4" name="TextBox 3">
+                <a:extLst>
+                  <a:ext uri="{FF2B5EF4-FFF2-40B4-BE49-F238E27FC236}">
+                    <a16:creationId xmlns:a16="http://schemas.microsoft.com/office/drawing/2014/main" id="{E7674DEB-29A6-07FD-ACE3-616AA5B11751}"/>
+                  </a:ext>
+                </a:extLst>
+              </p:cNvPr>
+              <p:cNvSpPr txBox="1"/>
+              <p:nvPr/>
+            </p:nvSpPr>
+            <p:spPr>
+              <a:xfrm>
+                <a:off x="1811875" y="1037236"/>
+                <a:ext cx="2790301" cy="461665"/>
+              </a:xfrm>
+              <a:prstGeom prst="rect">
+                <a:avLst/>
+              </a:prstGeom>
+              <a:noFill/>
+            </p:spPr>
+            <p:txBody>
+              <a:bodyPr wrap="square">
+                <a:spAutoFit/>
+              </a:bodyPr>
+              <a:lstStyle/>
+              <a:p>
+                <a:pPr/>
+                <a14:m>
+                  <m:oMathPara xmlns:m="http://schemas.openxmlformats.org/officeDocument/2006/math">
+                    <m:oMathParaPr>
+                      <m:jc m:val="centerGroup"/>
+                    </m:oMathParaPr>
+                    <m:oMath xmlns:m="http://schemas.openxmlformats.org/officeDocument/2006/math">
+                      <m:r>
+                        <a:rPr lang="en-US" sz="2400" b="0" i="1" smtClean="0">
+                          <a:solidFill>
+                            <a:schemeClr val="tx1"/>
+                          </a:solidFill>
+                          <a:latin typeface="Cambria Math" panose="02040503050406030204" pitchFamily="18" charset="0"/>
+                        </a:rPr>
+                        <m:t>𝑤</m:t>
+                      </m:r>
+                      <m:r>
+                        <a:rPr lang="en-US" sz="2400" b="0" i="1" smtClean="0">
+                          <a:solidFill>
+                            <a:schemeClr val="tx1"/>
+                          </a:solidFill>
+                          <a:latin typeface="Cambria Math" panose="02040503050406030204" pitchFamily="18" charset="0"/>
+                        </a:rPr>
+                        <m:t>~</m:t>
+                      </m:r>
+                      <m:r>
+                        <a:rPr lang="en-US" sz="2400" b="0" i="1" smtClean="0">
+                          <a:solidFill>
+                            <a:schemeClr val="tx1"/>
+                          </a:solidFill>
+                          <a:latin typeface="Cambria Math" panose="02040503050406030204" pitchFamily="18" charset="0"/>
+                        </a:rPr>
+                        <m:t>𝐺𝑎𝑢𝑠𝑠𝑖𝑎𝑛</m:t>
+                      </m:r>
+                      <m:r>
+                        <a:rPr lang="en-US" sz="2400" b="0" i="1" smtClean="0">
+                          <a:solidFill>
+                            <a:schemeClr val="tx1"/>
+                          </a:solidFill>
+                          <a:latin typeface="Cambria Math" panose="02040503050406030204" pitchFamily="18" charset="0"/>
+                        </a:rPr>
+                        <m:t> </m:t>
+                      </m:r>
+                      <m:d>
+                        <m:dPr>
+                          <m:ctrlPr>
+                            <a:rPr lang="en-US" sz="2400" b="0" i="1" smtClean="0">
+                              <a:solidFill>
+                                <a:schemeClr val="tx1"/>
+                              </a:solidFill>
+                              <a:latin typeface="Cambria Math" panose="02040503050406030204" pitchFamily="18" charset="0"/>
+                            </a:rPr>
+                          </m:ctrlPr>
+                        </m:dPr>
+                        <m:e>
+                          <m:sSup>
+                            <m:sSupPr>
+                              <m:ctrlPr>
+                                <a:rPr lang="en-US" sz="2400" b="0" i="1" smtClean="0">
+                                  <a:solidFill>
+                                    <a:schemeClr val="tx1"/>
+                                  </a:solidFill>
+                                  <a:latin typeface="Cambria Math" panose="02040503050406030204" pitchFamily="18" charset="0"/>
+                                </a:rPr>
+                              </m:ctrlPr>
+                            </m:sSupPr>
+                            <m:e>
+                              <m:r>
+                                <a:rPr lang="en-US" sz="2400" b="0" i="1" smtClean="0">
+                                  <a:solidFill>
+                                    <a:schemeClr val="tx1"/>
+                                  </a:solidFill>
+                                  <a:latin typeface="Cambria Math" panose="02040503050406030204" pitchFamily="18" charset="0"/>
+                                </a:rPr>
+                                <m:t>0,2</m:t>
+                              </m:r>
+                            </m:e>
+                            <m:sup>
+                              <m:r>
+                                <a:rPr lang="en-US" sz="2400" b="0" i="1" smtClean="0">
+                                  <a:solidFill>
+                                    <a:schemeClr val="tx1"/>
+                                  </a:solidFill>
+                                  <a:latin typeface="Cambria Math" panose="02040503050406030204" pitchFamily="18" charset="0"/>
+                                </a:rPr>
+                                <m:t>2</m:t>
+                              </m:r>
+                            </m:sup>
+                          </m:sSup>
+                        </m:e>
+                      </m:d>
+                    </m:oMath>
+                  </m:oMathPara>
+                </a14:m>
+                <a:endParaRPr lang="en-US" sz="2400" dirty="0"/>
+              </a:p>
+            </p:txBody>
+          </p:sp>
+        </mc:Choice>
+        <mc:Fallback>
+          <p:sp>
+            <p:nvSpPr>
+              <p:cNvPr id="4" name="TextBox 3">
+                <a:extLst>
+                  <a:ext uri="{FF2B5EF4-FFF2-40B4-BE49-F238E27FC236}">
+                    <a16:creationId xmlns:a16="http://schemas.microsoft.com/office/drawing/2014/main" id="{E7674DEB-29A6-07FD-ACE3-616AA5B11751}"/>
+                  </a:ext>
+                </a:extLst>
+              </p:cNvPr>
+              <p:cNvSpPr txBox="1">
+                <a:spLocks noRot="1" noChangeAspect="1" noMove="1" noResize="1" noEditPoints="1" noAdjustHandles="1" noChangeArrowheads="1" noChangeShapeType="1" noTextEdit="1"/>
+              </p:cNvSpPr>
+              <p:nvPr/>
+            </p:nvSpPr>
+            <p:spPr>
+              <a:xfrm>
+                <a:off x="1811875" y="1037236"/>
+                <a:ext cx="2790301" cy="461665"/>
+              </a:xfrm>
+              <a:prstGeom prst="rect">
+                <a:avLst/>
+              </a:prstGeom>
+              <a:blipFill>
+                <a:blip r:embed="rId6"/>
+                <a:stretch>
+                  <a:fillRect/>
+                </a:stretch>
+              </a:blipFill>
+            </p:spPr>
+            <p:txBody>
+              <a:bodyPr/>
+              <a:lstStyle/>
+              <a:p>
+                <a:r>
+                  <a:rPr lang="en-US">
+                    <a:noFill/>
+                  </a:rPr>
+                  <a:t> </a:t>
+                </a:r>
+              </a:p>
+            </p:txBody>
+          </p:sp>
+        </mc:Fallback>
+      </mc:AlternateContent>
+      <p:cxnSp>
+        <p:nvCxnSpPr>
+          <p:cNvPr id="6" name="Straight Arrow Connector 5">
+            <a:extLst>
+              <a:ext uri="{FF2B5EF4-FFF2-40B4-BE49-F238E27FC236}">
+                <a16:creationId xmlns:a16="http://schemas.microsoft.com/office/drawing/2014/main" id="{8B4F61FE-30C2-D9E3-8EC1-F1CC75B12CEF}"/>
+              </a:ext>
+            </a:extLst>
+          </p:cNvPr>
+          <p:cNvCxnSpPr>
+            <a:cxnSpLocks/>
+            <a:stCxn id="4" idx="2"/>
+            <a:endCxn id="3" idx="0"/>
+          </p:cNvCxnSpPr>
+          <p:nvPr/>
+        </p:nvCxnSpPr>
+        <p:spPr>
+          <a:xfrm>
+            <a:off x="3207026" y="1498901"/>
+            <a:ext cx="0" cy="299254"/>
+          </a:xfrm>
+          <a:prstGeom prst="straightConnector1">
+            <a:avLst/>
+          </a:prstGeom>
+          <a:ln>
+            <a:solidFill>
+              <a:schemeClr val="tx1"/>
+            </a:solidFill>
+            <a:prstDash val="lgDash"/>
+            <a:tailEnd type="triangle"/>
+          </a:ln>
+        </p:spPr>
+        <p:style>
+          <a:lnRef idx="1">
+            <a:schemeClr val="accent1"/>
+          </a:lnRef>
+          <a:fillRef idx="0">
+            <a:schemeClr val="accent1"/>
+          </a:fillRef>
+          <a:effectRef idx="0">
+            <a:schemeClr val="accent1"/>
+          </a:effectRef>
+          <a:fontRef idx="minor">
+            <a:schemeClr val="tx1"/>
+          </a:fontRef>
+        </p:style>
+      </p:cxnSp>
+    </p:spTree>
+    <p:extLst>
+      <p:ext uri="{BB962C8B-B14F-4D97-AF65-F5344CB8AC3E}">
+        <p14:creationId xmlns:p14="http://schemas.microsoft.com/office/powerpoint/2010/main" val="1524540945"/>
+      </p:ext>
+    </p:extLst>
+  </p:cSld>
+  <p:clrMapOvr>
+    <a:masterClrMapping/>
+  </p:clrMapOvr>
+</p:sld>
+</file>
+
+<file path=ppt/slides/slide3.xml><?xml version="1.0" encoding="utf-8"?>
+<p:sld xmlns:a="http://schemas.openxmlformats.org/drawingml/2006/main" xmlns:r="http://schemas.openxmlformats.org/officeDocument/2006/relationships" xmlns:p="http://schemas.openxmlformats.org/presentationml/2006/main">
+  <p:cSld>
+    <p:spTree>
+      <p:nvGrpSpPr>
+        <p:cNvPr id="1" name=""/>
+        <p:cNvGrpSpPr/>
+        <p:nvPr/>
+      </p:nvGrpSpPr>
+      <p:grpSpPr>
+        <a:xfrm>
+          <a:off x="0" y="0"/>
+          <a:ext cx="0" cy="0"/>
+          <a:chOff x="0" y="0"/>
+          <a:chExt cx="0" cy="0"/>
+        </a:xfrm>
+      </p:grpSpPr>
+      <mc:AlternateContent xmlns:mc="http://schemas.openxmlformats.org/markup-compatibility/2006">
+        <mc:Choice xmlns:a14="http://schemas.microsoft.com/office/drawing/2010/main" Requires="a14">
+          <p:sp>
+            <p:nvSpPr>
+              <p:cNvPr id="12" name="Rectangle 11">
+                <a:extLst>
+                  <a:ext uri="{FF2B5EF4-FFF2-40B4-BE49-F238E27FC236}">
+                    <a16:creationId xmlns:a16="http://schemas.microsoft.com/office/drawing/2014/main" id="{437991F8-4164-812F-66F6-C8E5155688BD}"/>
+                  </a:ext>
+                </a:extLst>
+              </p:cNvPr>
+              <p:cNvSpPr/>
+              <p:nvPr/>
+            </p:nvSpPr>
+            <p:spPr>
+              <a:xfrm>
+                <a:off x="4900803" y="1798155"/>
+                <a:ext cx="2236129" cy="1060174"/>
+              </a:xfrm>
+              <a:prstGeom prst="rect">
+                <a:avLst/>
+              </a:prstGeom>
+              <a:noFill/>
+              <a:ln w="28575">
+                <a:solidFill>
+                  <a:schemeClr val="tx1"/>
+                </a:solidFill>
+              </a:ln>
+            </p:spPr>
+            <p:style>
+              <a:lnRef idx="2">
+                <a:schemeClr val="accent1">
+                  <a:shade val="50000"/>
+                </a:schemeClr>
+              </a:lnRef>
+              <a:fillRef idx="1">
+                <a:schemeClr val="accent1"/>
+              </a:fillRef>
+              <a:effectRef idx="0">
+                <a:schemeClr val="accent1"/>
+              </a:effectRef>
+              <a:fontRef idx="minor">
+                <a:schemeClr val="lt1"/>
+              </a:fontRef>
+            </p:style>
+            <p:txBody>
+              <a:bodyPr rtlCol="0" anchor="ctr"/>
+              <a:lstStyle/>
+              <a:p>
+                <a:pPr algn="ctr"/>
+                <a14:m>
+                  <m:oMathPara xmlns:m="http://schemas.openxmlformats.org/officeDocument/2006/math">
+                    <m:oMathParaPr>
+                      <m:jc m:val="centerGroup"/>
+                    </m:oMathParaPr>
+                    <m:oMath xmlns:m="http://schemas.openxmlformats.org/officeDocument/2006/math">
+                      <m:r>
+                        <a:rPr lang="en-US" sz="2000" i="1" smtClean="0">
+                          <a:solidFill>
+                            <a:schemeClr val="tx1"/>
+                          </a:solidFill>
+                          <a:latin typeface="Cambria Math" panose="02040503050406030204" pitchFamily="18" charset="0"/>
+                        </a:rPr>
+                        <m:t>𝑀</m:t>
+                      </m:r>
+                      <m:d>
+                        <m:dPr>
+                          <m:ctrlPr>
+                            <a:rPr lang="en-US" sz="2000" i="1">
+                              <a:solidFill>
+                                <a:schemeClr val="tx1"/>
+                              </a:solidFill>
+                              <a:latin typeface="Cambria Math" panose="02040503050406030204" pitchFamily="18" charset="0"/>
+                            </a:rPr>
+                          </m:ctrlPr>
+                        </m:dPr>
+                        <m:e>
+                          <m:r>
+                            <a:rPr lang="en-US" sz="2000" i="1" smtClean="0">
+                              <a:solidFill>
+                                <a:schemeClr val="tx1"/>
+                              </a:solidFill>
+                              <a:latin typeface="Cambria Math" panose="02040503050406030204" pitchFamily="18" charset="0"/>
+                            </a:rPr>
+                            <m:t>𝜎</m:t>
+                          </m:r>
+                        </m:e>
+                      </m:d>
+                      <m:r>
+                        <a:rPr lang="en-US" sz="2000" i="1">
+                          <a:solidFill>
+                            <a:schemeClr val="tx1"/>
+                          </a:solidFill>
+                          <a:latin typeface="Cambria Math" panose="02040503050406030204" pitchFamily="18" charset="0"/>
+                        </a:rPr>
+                        <m:t>⊨</m:t>
+                      </m:r>
+                      <m:sSub>
+                        <m:sSubPr>
+                          <m:ctrlPr>
+                            <a:rPr lang="en-US" sz="2000" i="1">
+                              <a:solidFill>
+                                <a:schemeClr val="tx1"/>
+                              </a:solidFill>
+                              <a:latin typeface="Cambria Math" panose="02040503050406030204" pitchFamily="18" charset="0"/>
+                            </a:rPr>
+                          </m:ctrlPr>
+                        </m:sSubPr>
+                        <m:e>
+                          <m:r>
+                            <a:rPr lang="en-US" sz="2000" i="1">
+                              <a:solidFill>
+                                <a:schemeClr val="tx1"/>
+                              </a:solidFill>
+                              <a:latin typeface="Cambria Math" panose="02040503050406030204" pitchFamily="18" charset="0"/>
+                            </a:rPr>
+                            <m:t>𝐶</m:t>
+                          </m:r>
+                        </m:e>
+                        <m:sub>
+                          <m:r>
+                            <a:rPr lang="en-US" sz="2000" b="0" i="1" smtClean="0">
+                              <a:solidFill>
+                                <a:schemeClr val="tx1"/>
+                              </a:solidFill>
+                              <a:latin typeface="Cambria Math" panose="02040503050406030204" pitchFamily="18" charset="0"/>
+                            </a:rPr>
+                            <m:t>2</m:t>
+                          </m:r>
+                        </m:sub>
+                      </m:sSub>
+                      <m:d>
+                        <m:dPr>
+                          <m:ctrlPr>
+                            <a:rPr lang="en-US" sz="2000" i="1">
+                              <a:solidFill>
+                                <a:schemeClr val="tx1"/>
+                              </a:solidFill>
+                              <a:latin typeface="Cambria Math" panose="02040503050406030204" pitchFamily="18" charset="0"/>
+                            </a:rPr>
+                          </m:ctrlPr>
+                        </m:dPr>
+                        <m:e>
+                          <m:r>
+                            <a:rPr lang="en-US" sz="2000" i="1">
+                              <a:solidFill>
+                                <a:schemeClr val="tx1"/>
+                              </a:solidFill>
+                              <a:latin typeface="Cambria Math" panose="02040503050406030204" pitchFamily="18" charset="0"/>
+                            </a:rPr>
+                            <m:t>𝑝</m:t>
+                          </m:r>
+                        </m:e>
+                      </m:d>
+                    </m:oMath>
+                  </m:oMathPara>
+                </a14:m>
+                <a:endParaRPr lang="en-US" sz="2000" dirty="0"/>
+              </a:p>
+            </p:txBody>
+          </p:sp>
+        </mc:Choice>
+        <mc:Fallback>
+          <p:sp>
+            <p:nvSpPr>
+              <p:cNvPr id="12" name="Rectangle 11">
+                <a:extLst>
+                  <a:ext uri="{FF2B5EF4-FFF2-40B4-BE49-F238E27FC236}">
+                    <a16:creationId xmlns:a16="http://schemas.microsoft.com/office/drawing/2014/main" id="{437991F8-4164-812F-66F6-C8E5155688BD}"/>
+                  </a:ext>
+                </a:extLst>
+              </p:cNvPr>
+              <p:cNvSpPr>
+                <a:spLocks noRot="1" noChangeAspect="1" noMove="1" noResize="1" noEditPoints="1" noAdjustHandles="1" noChangeArrowheads="1" noChangeShapeType="1" noTextEdit="1"/>
+              </p:cNvSpPr>
+              <p:nvPr/>
+            </p:nvSpPr>
+            <p:spPr>
+              <a:xfrm>
+                <a:off x="4900803" y="1798155"/>
+                <a:ext cx="2236129" cy="1060174"/>
+              </a:xfrm>
+              <a:prstGeom prst="rect">
+                <a:avLst/>
+              </a:prstGeom>
+              <a:blipFill>
+                <a:blip r:embed="rId2"/>
+                <a:stretch>
+                  <a:fillRect/>
+                </a:stretch>
+              </a:blipFill>
+              <a:ln w="28575">
+                <a:solidFill>
+                  <a:schemeClr val="tx1"/>
+                </a:solidFill>
+              </a:ln>
+            </p:spPr>
+            <p:txBody>
+              <a:bodyPr/>
+              <a:lstStyle/>
+              <a:p>
+                <a:r>
+                  <a:rPr lang="en-US">
+                    <a:noFill/>
+                  </a:rPr>
+                  <a:t> </a:t>
+                </a:r>
+              </a:p>
+            </p:txBody>
+          </p:sp>
+        </mc:Fallback>
+      </mc:AlternateContent>
+      <mc:AlternateContent xmlns:mc="http://schemas.openxmlformats.org/markup-compatibility/2006">
+        <mc:Choice xmlns:a14="http://schemas.microsoft.com/office/drawing/2010/main" Requires="a14">
+          <p:sp>
+            <p:nvSpPr>
+              <p:cNvPr id="3" name="Rectangle 2">
+                <a:extLst>
+                  <a:ext uri="{FF2B5EF4-FFF2-40B4-BE49-F238E27FC236}">
+                    <a16:creationId xmlns:a16="http://schemas.microsoft.com/office/drawing/2014/main" id="{81697CEE-E40C-8AF1-39F1-8792A7BBBEC3}"/>
+                  </a:ext>
+                </a:extLst>
+              </p:cNvPr>
+              <p:cNvSpPr/>
+              <p:nvPr/>
+            </p:nvSpPr>
+            <p:spPr>
+              <a:xfrm>
+                <a:off x="1925053" y="1798155"/>
+                <a:ext cx="2236129" cy="1060174"/>
+              </a:xfrm>
+              <a:prstGeom prst="rect">
+                <a:avLst/>
+              </a:prstGeom>
+              <a:solidFill>
+                <a:schemeClr val="bg1"/>
+              </a:solidFill>
+              <a:ln w="28575">
+                <a:solidFill>
+                  <a:schemeClr val="tx1"/>
+                </a:solidFill>
+              </a:ln>
+            </p:spPr>
+            <p:style>
+              <a:lnRef idx="2">
+                <a:schemeClr val="accent1">
+                  <a:shade val="50000"/>
+                </a:schemeClr>
+              </a:lnRef>
+              <a:fillRef idx="1">
+                <a:schemeClr val="accent1"/>
+              </a:fillRef>
+              <a:effectRef idx="0">
+                <a:schemeClr val="accent1"/>
+              </a:effectRef>
+              <a:fontRef idx="minor">
+                <a:schemeClr val="lt1"/>
+              </a:fontRef>
+            </p:style>
+            <p:txBody>
+              <a:bodyPr rtlCol="0" anchor="ctr"/>
+              <a:lstStyle/>
+              <a:p>
+                <a:pPr algn="ctr"/>
+                <a14:m>
+                  <m:oMathPara xmlns:m="http://schemas.openxmlformats.org/officeDocument/2006/math">
+                    <m:oMathParaPr>
+                      <m:jc m:val="centerGroup"/>
+                    </m:oMathParaPr>
+                    <m:oMath xmlns:m="http://schemas.openxmlformats.org/officeDocument/2006/math">
+                      <m:r>
+                        <a:rPr lang="en-US" sz="2000" b="0" i="1" smtClean="0">
+                          <a:solidFill>
+                            <a:schemeClr val="tx1"/>
+                          </a:solidFill>
+                          <a:latin typeface="Cambria Math" panose="02040503050406030204" pitchFamily="18" charset="0"/>
+                        </a:rPr>
+                        <m:t>𝑀</m:t>
+                      </m:r>
+                      <m:d>
+                        <m:dPr>
+                          <m:ctrlPr>
+                            <a:rPr lang="en-US" sz="2000" b="0" i="1" smtClean="0">
+                              <a:solidFill>
+                                <a:schemeClr val="tx1"/>
+                              </a:solidFill>
+                              <a:latin typeface="Cambria Math" panose="02040503050406030204" pitchFamily="18" charset="0"/>
+                            </a:rPr>
+                          </m:ctrlPr>
+                        </m:dPr>
+                        <m:e>
+                          <m:r>
+                            <a:rPr lang="en-US" sz="2000" i="1">
+                              <a:solidFill>
+                                <a:schemeClr val="tx1"/>
+                              </a:solidFill>
+                              <a:latin typeface="Cambria Math" panose="02040503050406030204" pitchFamily="18" charset="0"/>
+                            </a:rPr>
+                            <m:t>𝜎</m:t>
+                          </m:r>
+                        </m:e>
+                      </m:d>
+                      <m:r>
+                        <a:rPr lang="en-US" sz="2000" b="0" i="1" smtClean="0">
+                          <a:solidFill>
+                            <a:schemeClr val="tx1"/>
+                          </a:solidFill>
+                          <a:latin typeface="Cambria Math" panose="02040503050406030204" pitchFamily="18" charset="0"/>
+                        </a:rPr>
+                        <m:t>⊨</m:t>
+                      </m:r>
+                      <m:sSub>
+                        <m:sSubPr>
+                          <m:ctrlPr>
+                            <a:rPr lang="en-US" sz="2000" b="0" i="1" smtClean="0">
+                              <a:solidFill>
+                                <a:schemeClr val="tx1"/>
+                              </a:solidFill>
+                              <a:latin typeface="Cambria Math" panose="02040503050406030204" pitchFamily="18" charset="0"/>
+                            </a:rPr>
+                          </m:ctrlPr>
+                        </m:sSubPr>
+                        <m:e>
+                          <m:r>
+                            <a:rPr lang="en-US" sz="2000" b="0" i="1" smtClean="0">
+                              <a:solidFill>
+                                <a:schemeClr val="tx1"/>
+                              </a:solidFill>
+                              <a:latin typeface="Cambria Math" panose="02040503050406030204" pitchFamily="18" charset="0"/>
+                            </a:rPr>
+                            <m:t>𝐶</m:t>
+                          </m:r>
+                        </m:e>
+                        <m:sub>
+                          <m:r>
+                            <a:rPr lang="en-US" sz="2000" b="0" i="1" smtClean="0">
+                              <a:solidFill>
+                                <a:schemeClr val="tx1"/>
+                              </a:solidFill>
+                              <a:latin typeface="Cambria Math" panose="02040503050406030204" pitchFamily="18" charset="0"/>
+                            </a:rPr>
+                            <m:t>1</m:t>
+                          </m:r>
+                        </m:sub>
+                      </m:sSub>
+                    </m:oMath>
+                  </m:oMathPara>
+                </a14:m>
+                <a:endParaRPr lang="en-US" sz="2000" dirty="0"/>
+              </a:p>
+            </p:txBody>
+          </p:sp>
+        </mc:Choice>
+        <mc:Fallback>
+          <p:sp>
+            <p:nvSpPr>
+              <p:cNvPr id="3" name="Rectangle 2">
+                <a:extLst>
+                  <a:ext uri="{FF2B5EF4-FFF2-40B4-BE49-F238E27FC236}">
+                    <a16:creationId xmlns:a16="http://schemas.microsoft.com/office/drawing/2014/main" id="{81697CEE-E40C-8AF1-39F1-8792A7BBBEC3}"/>
+                  </a:ext>
+                </a:extLst>
+              </p:cNvPr>
+              <p:cNvSpPr>
+                <a:spLocks noRot="1" noChangeAspect="1" noMove="1" noResize="1" noEditPoints="1" noAdjustHandles="1" noChangeArrowheads="1" noChangeShapeType="1" noTextEdit="1"/>
+              </p:cNvSpPr>
+              <p:nvPr/>
+            </p:nvSpPr>
+            <p:spPr>
+              <a:xfrm>
+                <a:off x="1925053" y="1798155"/>
+                <a:ext cx="2236129" cy="1060174"/>
+              </a:xfrm>
+              <a:prstGeom prst="rect">
+                <a:avLst/>
+              </a:prstGeom>
+              <a:blipFill>
+                <a:blip r:embed="rId3"/>
+                <a:stretch>
+                  <a:fillRect/>
+                </a:stretch>
+              </a:blipFill>
+              <a:ln w="28575">
+                <a:solidFill>
+                  <a:schemeClr val="tx1"/>
+                </a:solidFill>
+              </a:ln>
+            </p:spPr>
+            <p:txBody>
+              <a:bodyPr/>
+              <a:lstStyle/>
+              <a:p>
+                <a:r>
+                  <a:rPr lang="en-US">
+                    <a:noFill/>
+                  </a:rPr>
+                  <a:t> </a:t>
+                </a:r>
+              </a:p>
+            </p:txBody>
+          </p:sp>
+        </mc:Fallback>
+      </mc:AlternateContent>
+      <p:cxnSp>
+        <p:nvCxnSpPr>
+          <p:cNvPr id="7" name="Straight Arrow Connector 6">
+            <a:extLst>
+              <a:ext uri="{FF2B5EF4-FFF2-40B4-BE49-F238E27FC236}">
+                <a16:creationId xmlns:a16="http://schemas.microsoft.com/office/drawing/2014/main" id="{8276139F-8C68-CEC8-010E-25C8C8E48C3E}"/>
+              </a:ext>
+            </a:extLst>
+          </p:cNvPr>
+          <p:cNvCxnSpPr>
+            <a:cxnSpLocks/>
+          </p:cNvCxnSpPr>
+          <p:nvPr/>
+        </p:nvCxnSpPr>
+        <p:spPr>
+          <a:xfrm>
+            <a:off x="9617044" y="1553418"/>
+            <a:ext cx="1245704" cy="0"/>
+          </a:xfrm>
+          <a:prstGeom prst="straightConnector1">
+            <a:avLst/>
+          </a:prstGeom>
+          <a:ln>
+            <a:solidFill>
+              <a:schemeClr val="tx1"/>
+            </a:solidFill>
+            <a:tailEnd type="triangle"/>
+          </a:ln>
+        </p:spPr>
+        <p:style>
+          <a:lnRef idx="1">
+            <a:schemeClr val="accent1"/>
+          </a:lnRef>
+          <a:fillRef idx="0">
+            <a:schemeClr val="accent1"/>
+          </a:fillRef>
+          <a:effectRef idx="0">
+            <a:schemeClr val="accent1"/>
+          </a:effectRef>
+          <a:fontRef idx="minor">
+            <a:schemeClr val="tx1"/>
+          </a:fontRef>
+        </p:style>
+      </p:cxnSp>
+      <mc:AlternateContent xmlns:mc="http://schemas.openxmlformats.org/markup-compatibility/2006">
+        <mc:Choice xmlns:a14="http://schemas.microsoft.com/office/drawing/2010/main" Requires="a14">
+          <p:sp>
+            <p:nvSpPr>
+              <p:cNvPr id="11" name="TextBox 10">
+                <a:extLst>
+                  <a:ext uri="{FF2B5EF4-FFF2-40B4-BE49-F238E27FC236}">
+                    <a16:creationId xmlns:a16="http://schemas.microsoft.com/office/drawing/2014/main" id="{0CF76764-698E-B5B3-EC2C-6914FA54D6BC}"/>
+                  </a:ext>
+                </a:extLst>
+              </p:cNvPr>
+              <p:cNvSpPr txBox="1"/>
+              <p:nvPr/>
+            </p:nvSpPr>
+            <p:spPr>
+              <a:xfrm>
+                <a:off x="9928470" y="1023331"/>
+                <a:ext cx="622852" cy="461665"/>
+              </a:xfrm>
+              <a:prstGeom prst="rect">
+                <a:avLst/>
+              </a:prstGeom>
+              <a:noFill/>
+            </p:spPr>
+            <p:txBody>
+              <a:bodyPr wrap="square">
+                <a:spAutoFit/>
+              </a:bodyPr>
+              <a:lstStyle/>
+              <a:p>
+                <a:pPr/>
+                <a14:m>
+                  <m:oMathPara xmlns:m="http://schemas.openxmlformats.org/officeDocument/2006/math">
+                    <m:oMathParaPr>
+                      <m:jc m:val="centerGroup"/>
+                    </m:oMathParaPr>
+                    <m:oMath xmlns:m="http://schemas.openxmlformats.org/officeDocument/2006/math">
+                      <m:r>
+                        <a:rPr lang="en-US" sz="2400" b="0" i="1" smtClean="0">
+                          <a:solidFill>
+                            <a:schemeClr val="tx1"/>
+                          </a:solidFill>
+                          <a:latin typeface="Cambria Math" panose="02040503050406030204" pitchFamily="18" charset="0"/>
+                        </a:rPr>
+                        <m:t>𝑢</m:t>
+                      </m:r>
+                    </m:oMath>
+                  </m:oMathPara>
+                </a14:m>
+                <a:endParaRPr lang="en-US" sz="2400" dirty="0"/>
+              </a:p>
+            </p:txBody>
+          </p:sp>
+        </mc:Choice>
+        <mc:Fallback>
+          <p:sp>
+            <p:nvSpPr>
+              <p:cNvPr id="11" name="TextBox 10">
+                <a:extLst>
+                  <a:ext uri="{FF2B5EF4-FFF2-40B4-BE49-F238E27FC236}">
+                    <a16:creationId xmlns:a16="http://schemas.microsoft.com/office/drawing/2014/main" id="{0CF76764-698E-B5B3-EC2C-6914FA54D6BC}"/>
+                  </a:ext>
+                </a:extLst>
+              </p:cNvPr>
+              <p:cNvSpPr txBox="1">
+                <a:spLocks noRot="1" noChangeAspect="1" noMove="1" noResize="1" noEditPoints="1" noAdjustHandles="1" noChangeArrowheads="1" noChangeShapeType="1" noTextEdit="1"/>
+              </p:cNvSpPr>
+              <p:nvPr/>
+            </p:nvSpPr>
+            <p:spPr>
+              <a:xfrm>
+                <a:off x="9928470" y="1023331"/>
+                <a:ext cx="622852" cy="461665"/>
+              </a:xfrm>
+              <a:prstGeom prst="rect">
+                <a:avLst/>
+              </a:prstGeom>
+              <a:blipFill>
+                <a:blip r:embed="rId4"/>
+                <a:stretch>
+                  <a:fillRect/>
+                </a:stretch>
+              </a:blipFill>
+            </p:spPr>
+            <p:txBody>
+              <a:bodyPr/>
+              <a:lstStyle/>
+              <a:p>
+                <a:r>
+                  <a:rPr lang="en-US">
+                    <a:noFill/>
+                  </a:rPr>
+                  <a:t> </a:t>
+                </a:r>
+              </a:p>
+            </p:txBody>
+          </p:sp>
+        </mc:Fallback>
+      </mc:AlternateContent>
+      <mc:AlternateContent xmlns:mc="http://schemas.openxmlformats.org/markup-compatibility/2006">
+        <mc:Choice xmlns:a14="http://schemas.microsoft.com/office/drawing/2010/main" Requires="a14">
+          <p:sp>
+            <p:nvSpPr>
+              <p:cNvPr id="4" name="TextBox 3">
+                <a:extLst>
+                  <a:ext uri="{FF2B5EF4-FFF2-40B4-BE49-F238E27FC236}">
+                    <a16:creationId xmlns:a16="http://schemas.microsoft.com/office/drawing/2014/main" id="{E7674DEB-29A6-07FD-ACE3-616AA5B11751}"/>
+                  </a:ext>
+                </a:extLst>
+              </p:cNvPr>
+              <p:cNvSpPr txBox="1"/>
+              <p:nvPr/>
+            </p:nvSpPr>
+            <p:spPr>
+              <a:xfrm>
+                <a:off x="1647967" y="1023331"/>
+                <a:ext cx="2790301" cy="461665"/>
+              </a:xfrm>
+              <a:prstGeom prst="rect">
+                <a:avLst/>
+              </a:prstGeom>
+              <a:noFill/>
+            </p:spPr>
+            <p:txBody>
+              <a:bodyPr wrap="square">
+                <a:spAutoFit/>
+              </a:bodyPr>
+              <a:lstStyle/>
+              <a:p>
+                <a:pPr/>
+                <a14:m>
+                  <m:oMathPara xmlns:m="http://schemas.openxmlformats.org/officeDocument/2006/math">
+                    <m:oMathParaPr>
+                      <m:jc m:val="centerGroup"/>
+                    </m:oMathParaPr>
+                    <m:oMath xmlns:m="http://schemas.openxmlformats.org/officeDocument/2006/math">
+                      <m:r>
+                        <a:rPr lang="en-US" sz="2400" b="0" i="1" smtClean="0">
+                          <a:solidFill>
+                            <a:schemeClr val="tx1"/>
+                          </a:solidFill>
+                          <a:latin typeface="Cambria Math" panose="02040503050406030204" pitchFamily="18" charset="0"/>
+                        </a:rPr>
+                        <m:t>𝑤</m:t>
+                      </m:r>
+                      <m:r>
+                        <a:rPr lang="en-US" sz="2400" b="0" i="1" smtClean="0">
+                          <a:solidFill>
+                            <a:schemeClr val="tx1"/>
+                          </a:solidFill>
+                          <a:latin typeface="Cambria Math" panose="02040503050406030204" pitchFamily="18" charset="0"/>
+                        </a:rPr>
+                        <m:t>~</m:t>
+                      </m:r>
+                      <m:r>
+                        <a:rPr lang="en-US" sz="2400" b="0" i="1" smtClean="0">
+                          <a:solidFill>
+                            <a:schemeClr val="tx1"/>
+                          </a:solidFill>
+                          <a:latin typeface="Cambria Math" panose="02040503050406030204" pitchFamily="18" charset="0"/>
+                        </a:rPr>
+                        <m:t>𝐺𝑎𝑢𝑠𝑠𝑖𝑎𝑛</m:t>
+                      </m:r>
+                      <m:r>
+                        <a:rPr lang="en-US" sz="2400" b="0" i="1" smtClean="0">
+                          <a:solidFill>
+                            <a:schemeClr val="tx1"/>
+                          </a:solidFill>
+                          <a:latin typeface="Cambria Math" panose="02040503050406030204" pitchFamily="18" charset="0"/>
+                        </a:rPr>
+                        <m:t> </m:t>
+                      </m:r>
+                      <m:d>
+                        <m:dPr>
+                          <m:ctrlPr>
+                            <a:rPr lang="en-US" sz="2400" b="0" i="1" smtClean="0">
+                              <a:solidFill>
+                                <a:schemeClr val="tx1"/>
+                              </a:solidFill>
+                              <a:latin typeface="Cambria Math" panose="02040503050406030204" pitchFamily="18" charset="0"/>
+                            </a:rPr>
+                          </m:ctrlPr>
+                        </m:dPr>
+                        <m:e>
+                          <m:sSup>
+                            <m:sSupPr>
+                              <m:ctrlPr>
+                                <a:rPr lang="en-US" sz="2400" b="0" i="1" smtClean="0">
+                                  <a:solidFill>
+                                    <a:schemeClr val="tx1"/>
+                                  </a:solidFill>
+                                  <a:latin typeface="Cambria Math" panose="02040503050406030204" pitchFamily="18" charset="0"/>
+                                </a:rPr>
+                              </m:ctrlPr>
+                            </m:sSupPr>
+                            <m:e>
+                              <m:r>
+                                <a:rPr lang="en-US" sz="2400" b="0" i="1" smtClean="0">
+                                  <a:solidFill>
+                                    <a:schemeClr val="tx1"/>
+                                  </a:solidFill>
+                                  <a:latin typeface="Cambria Math" panose="02040503050406030204" pitchFamily="18" charset="0"/>
+                                </a:rPr>
+                                <m:t>0,</m:t>
+                              </m:r>
+                              <m:r>
+                                <a:rPr lang="en-US" sz="2400" b="0" i="1" smtClean="0">
+                                  <a:solidFill>
+                                    <a:schemeClr val="tx1"/>
+                                  </a:solidFill>
+                                  <a:latin typeface="Cambria Math" panose="02040503050406030204" pitchFamily="18" charset="0"/>
+                                </a:rPr>
+                                <m:t>𝜎</m:t>
+                              </m:r>
+                            </m:e>
+                            <m:sup>
+                              <m:r>
+                                <a:rPr lang="en-US" sz="2400" b="0" i="1" smtClean="0">
+                                  <a:solidFill>
+                                    <a:schemeClr val="tx1"/>
+                                  </a:solidFill>
+                                  <a:latin typeface="Cambria Math" panose="02040503050406030204" pitchFamily="18" charset="0"/>
+                                </a:rPr>
+                                <m:t>2</m:t>
+                              </m:r>
+                            </m:sup>
+                          </m:sSup>
+                        </m:e>
+                      </m:d>
+                    </m:oMath>
+                  </m:oMathPara>
+                </a14:m>
+                <a:endParaRPr lang="en-US" sz="2400" dirty="0"/>
+              </a:p>
+            </p:txBody>
+          </p:sp>
+        </mc:Choice>
+        <mc:Fallback>
+          <p:sp>
+            <p:nvSpPr>
+              <p:cNvPr id="4" name="TextBox 3">
+                <a:extLst>
+                  <a:ext uri="{FF2B5EF4-FFF2-40B4-BE49-F238E27FC236}">
+                    <a16:creationId xmlns:a16="http://schemas.microsoft.com/office/drawing/2014/main" id="{E7674DEB-29A6-07FD-ACE3-616AA5B11751}"/>
+                  </a:ext>
+                </a:extLst>
+              </p:cNvPr>
+              <p:cNvSpPr txBox="1">
+                <a:spLocks noRot="1" noChangeAspect="1" noMove="1" noResize="1" noEditPoints="1" noAdjustHandles="1" noChangeArrowheads="1" noChangeShapeType="1" noTextEdit="1"/>
+              </p:cNvSpPr>
+              <p:nvPr/>
+            </p:nvSpPr>
+            <p:spPr>
+              <a:xfrm>
+                <a:off x="1647967" y="1023331"/>
+                <a:ext cx="2790301" cy="461665"/>
+              </a:xfrm>
+              <a:prstGeom prst="rect">
+                <a:avLst/>
+              </a:prstGeom>
+              <a:blipFill>
+                <a:blip r:embed="rId5"/>
+                <a:stretch>
+                  <a:fillRect/>
+                </a:stretch>
+              </a:blipFill>
+            </p:spPr>
+            <p:txBody>
+              <a:bodyPr/>
+              <a:lstStyle/>
+              <a:p>
+                <a:r>
+                  <a:rPr lang="en-US">
+                    <a:noFill/>
+                  </a:rPr>
+                  <a:t> </a:t>
+                </a:r>
+              </a:p>
+            </p:txBody>
+          </p:sp>
+        </mc:Fallback>
+      </mc:AlternateContent>
+      <p:cxnSp>
+        <p:nvCxnSpPr>
+          <p:cNvPr id="6" name="Straight Arrow Connector 5">
+            <a:extLst>
+              <a:ext uri="{FF2B5EF4-FFF2-40B4-BE49-F238E27FC236}">
+                <a16:creationId xmlns:a16="http://schemas.microsoft.com/office/drawing/2014/main" id="{8B4F61FE-30C2-D9E3-8EC1-F1CC75B12CEF}"/>
+              </a:ext>
+            </a:extLst>
+          </p:cNvPr>
+          <p:cNvCxnSpPr>
+            <a:cxnSpLocks/>
+            <a:stCxn id="4" idx="2"/>
+            <a:endCxn id="3" idx="0"/>
+          </p:cNvCxnSpPr>
+          <p:nvPr/>
+        </p:nvCxnSpPr>
+        <p:spPr>
+          <a:xfrm>
+            <a:off x="3043118" y="1484996"/>
+            <a:ext cx="0" cy="313159"/>
+          </a:xfrm>
+          <a:prstGeom prst="straightConnector1">
+            <a:avLst/>
+          </a:prstGeom>
+          <a:ln>
+            <a:solidFill>
+              <a:schemeClr val="tx1"/>
+            </a:solidFill>
+            <a:prstDash val="lgDash"/>
+            <a:tailEnd type="triangle"/>
+          </a:ln>
+        </p:spPr>
+        <p:style>
+          <a:lnRef idx="1">
+            <a:schemeClr val="accent1"/>
+          </a:lnRef>
+          <a:fillRef idx="0">
+            <a:schemeClr val="accent1"/>
+          </a:fillRef>
+          <a:effectRef idx="0">
+            <a:schemeClr val="accent1"/>
+          </a:effectRef>
+          <a:fontRef idx="minor">
+            <a:schemeClr val="tx1"/>
+          </a:fontRef>
+        </p:style>
+      </p:cxnSp>
+      <p:cxnSp>
+        <p:nvCxnSpPr>
+          <p:cNvPr id="25" name="Connector: Elbow 24">
+            <a:extLst>
+              <a:ext uri="{FF2B5EF4-FFF2-40B4-BE49-F238E27FC236}">
+                <a16:creationId xmlns:a16="http://schemas.microsoft.com/office/drawing/2014/main" id="{7935C83B-66C3-6FD6-554F-C71208D72504}"/>
+              </a:ext>
+            </a:extLst>
+          </p:cNvPr>
+          <p:cNvCxnSpPr>
+            <a:stCxn id="4" idx="3"/>
+            <a:endCxn id="12" idx="0"/>
+          </p:cNvCxnSpPr>
+          <p:nvPr/>
+        </p:nvCxnSpPr>
+        <p:spPr>
+          <a:xfrm>
+            <a:off x="4438268" y="1254164"/>
+            <a:ext cx="1580600" cy="543991"/>
+          </a:xfrm>
+          <a:prstGeom prst="bentConnector2">
+            <a:avLst/>
+          </a:prstGeom>
+          <a:ln>
+            <a:solidFill>
+              <a:schemeClr val="tx1"/>
+            </a:solidFill>
+            <a:prstDash val="lgDash"/>
+            <a:tailEnd type="triangle"/>
+          </a:ln>
+        </p:spPr>
+        <p:style>
+          <a:lnRef idx="1">
+            <a:schemeClr val="accent1"/>
+          </a:lnRef>
+          <a:fillRef idx="0">
+            <a:schemeClr val="accent1"/>
+          </a:fillRef>
+          <a:effectRef idx="0">
+            <a:schemeClr val="accent1"/>
+          </a:effectRef>
+          <a:fontRef idx="minor">
+            <a:schemeClr val="tx1"/>
+          </a:fontRef>
+        </p:style>
+      </p:cxnSp>
+      <mc:AlternateContent xmlns:mc="http://schemas.openxmlformats.org/markup-compatibility/2006">
+        <mc:Choice xmlns:a14="http://schemas.microsoft.com/office/drawing/2010/main" Requires="a14">
+          <p:sp>
+            <p:nvSpPr>
+              <p:cNvPr id="26" name="Rectangle 25">
+                <a:extLst>
+                  <a:ext uri="{FF2B5EF4-FFF2-40B4-BE49-F238E27FC236}">
+                    <a16:creationId xmlns:a16="http://schemas.microsoft.com/office/drawing/2014/main" id="{48EAA940-F327-CCBE-FF46-D4A781B7FA0D}"/>
+                  </a:ext>
+                </a:extLst>
+              </p:cNvPr>
+              <p:cNvSpPr/>
+              <p:nvPr/>
+            </p:nvSpPr>
+            <p:spPr>
+              <a:xfrm>
+                <a:off x="4900803" y="4774495"/>
+                <a:ext cx="2236129" cy="1060174"/>
+              </a:xfrm>
+              <a:prstGeom prst="rect">
+                <a:avLst/>
+              </a:prstGeom>
+              <a:noFill/>
+              <a:ln w="28575">
+                <a:solidFill>
+                  <a:schemeClr val="tx1"/>
+                </a:solidFill>
+              </a:ln>
+            </p:spPr>
+            <p:style>
+              <a:lnRef idx="2">
+                <a:schemeClr val="accent1">
+                  <a:shade val="50000"/>
+                </a:schemeClr>
+              </a:lnRef>
+              <a:fillRef idx="1">
+                <a:schemeClr val="accent1"/>
+              </a:fillRef>
+              <a:effectRef idx="0">
+                <a:schemeClr val="accent1"/>
+              </a:effectRef>
+              <a:fontRef idx="minor">
+                <a:schemeClr val="lt1"/>
+              </a:fontRef>
+            </p:style>
+            <p:txBody>
+              <a:bodyPr rtlCol="0" anchor="ctr"/>
+              <a:lstStyle/>
+              <a:p>
+                <a:pPr algn="ctr"/>
+                <a14:m>
+                  <m:oMathPara xmlns:m="http://schemas.openxmlformats.org/officeDocument/2006/math">
+                    <m:oMathParaPr>
+                      <m:jc m:val="centerGroup"/>
+                    </m:oMathParaPr>
+                    <m:oMath xmlns:m="http://schemas.openxmlformats.org/officeDocument/2006/math">
+                      <m:r>
+                        <a:rPr lang="en-US" sz="2000" i="1" smtClean="0">
+                          <a:solidFill>
+                            <a:schemeClr val="tx1"/>
+                          </a:solidFill>
+                          <a:latin typeface="Cambria Math" panose="02040503050406030204" pitchFamily="18" charset="0"/>
+                        </a:rPr>
+                        <m:t>𝑀</m:t>
+                      </m:r>
+                      <m:d>
+                        <m:dPr>
+                          <m:ctrlPr>
+                            <a:rPr lang="en-US" sz="2000" i="1">
+                              <a:solidFill>
+                                <a:schemeClr val="tx1"/>
+                              </a:solidFill>
+                              <a:latin typeface="Cambria Math" panose="02040503050406030204" pitchFamily="18" charset="0"/>
+                            </a:rPr>
+                          </m:ctrlPr>
+                        </m:dPr>
+                        <m:e>
+                          <m:r>
+                            <a:rPr lang="en-US" sz="2000" i="1" smtClean="0">
+                              <a:solidFill>
+                                <a:schemeClr val="tx1"/>
+                              </a:solidFill>
+                              <a:latin typeface="Cambria Math" panose="02040503050406030204" pitchFamily="18" charset="0"/>
+                            </a:rPr>
+                            <m:t>𝜎</m:t>
+                          </m:r>
+                        </m:e>
+                      </m:d>
+                      <m:r>
+                        <a:rPr lang="en-US" sz="2000" i="1">
+                          <a:solidFill>
+                            <a:schemeClr val="tx1"/>
+                          </a:solidFill>
+                          <a:latin typeface="Cambria Math" panose="02040503050406030204" pitchFamily="18" charset="0"/>
+                        </a:rPr>
+                        <m:t>⊨</m:t>
+                      </m:r>
+                      <m:sSub>
+                        <m:sSubPr>
+                          <m:ctrlPr>
+                            <a:rPr lang="en-US" sz="2000" i="1">
+                              <a:solidFill>
+                                <a:schemeClr val="tx1"/>
+                              </a:solidFill>
+                              <a:latin typeface="Cambria Math" panose="02040503050406030204" pitchFamily="18" charset="0"/>
+                            </a:rPr>
+                          </m:ctrlPr>
+                        </m:sSubPr>
+                        <m:e>
+                          <m:r>
+                            <a:rPr lang="en-US" sz="2000" i="1">
+                              <a:solidFill>
+                                <a:schemeClr val="tx1"/>
+                              </a:solidFill>
+                              <a:latin typeface="Cambria Math" panose="02040503050406030204" pitchFamily="18" charset="0"/>
+                            </a:rPr>
+                            <m:t>𝐶</m:t>
+                          </m:r>
+                        </m:e>
+                        <m:sub>
+                          <m:r>
+                            <a:rPr lang="en-US" sz="2000" b="0" i="1" smtClean="0">
+                              <a:solidFill>
+                                <a:schemeClr val="tx1"/>
+                              </a:solidFill>
+                              <a:latin typeface="Cambria Math" panose="02040503050406030204" pitchFamily="18" charset="0"/>
+                            </a:rPr>
+                            <m:t>2</m:t>
+                          </m:r>
+                        </m:sub>
+                      </m:sSub>
+                    </m:oMath>
+                  </m:oMathPara>
+                </a14:m>
+                <a:endParaRPr lang="en-US" sz="2000" dirty="0"/>
+              </a:p>
+            </p:txBody>
+          </p:sp>
+        </mc:Choice>
+        <mc:Fallback>
+          <p:sp>
+            <p:nvSpPr>
+              <p:cNvPr id="26" name="Rectangle 25">
+                <a:extLst>
+                  <a:ext uri="{FF2B5EF4-FFF2-40B4-BE49-F238E27FC236}">
+                    <a16:creationId xmlns:a16="http://schemas.microsoft.com/office/drawing/2014/main" id="{48EAA940-F327-CCBE-FF46-D4A781B7FA0D}"/>
+                  </a:ext>
+                </a:extLst>
+              </p:cNvPr>
+              <p:cNvSpPr>
+                <a:spLocks noRot="1" noChangeAspect="1" noMove="1" noResize="1" noEditPoints="1" noAdjustHandles="1" noChangeArrowheads="1" noChangeShapeType="1" noTextEdit="1"/>
+              </p:cNvSpPr>
+              <p:nvPr/>
+            </p:nvSpPr>
+            <p:spPr>
+              <a:xfrm>
+                <a:off x="4900803" y="4774495"/>
+                <a:ext cx="2236129" cy="1060174"/>
+              </a:xfrm>
+              <a:prstGeom prst="rect">
+                <a:avLst/>
+              </a:prstGeom>
+              <a:blipFill>
+                <a:blip r:embed="rId6"/>
+                <a:stretch>
+                  <a:fillRect/>
+                </a:stretch>
+              </a:blipFill>
+              <a:ln w="28575">
+                <a:solidFill>
+                  <a:schemeClr val="tx1"/>
+                </a:solidFill>
+              </a:ln>
+            </p:spPr>
+            <p:txBody>
+              <a:bodyPr/>
+              <a:lstStyle/>
+              <a:p>
+                <a:r>
+                  <a:rPr lang="en-US">
+                    <a:noFill/>
+                  </a:rPr>
+                  <a:t> </a:t>
+                </a:r>
+              </a:p>
+            </p:txBody>
+          </p:sp>
+        </mc:Fallback>
+      </mc:AlternateContent>
+      <mc:AlternateContent xmlns:mc="http://schemas.openxmlformats.org/markup-compatibility/2006">
+        <mc:Choice xmlns:a14="http://schemas.microsoft.com/office/drawing/2010/main" Requires="a14">
+          <p:sp>
+            <p:nvSpPr>
+              <p:cNvPr id="27" name="Rectangle 26">
+                <a:extLst>
+                  <a:ext uri="{FF2B5EF4-FFF2-40B4-BE49-F238E27FC236}">
+                    <a16:creationId xmlns:a16="http://schemas.microsoft.com/office/drawing/2014/main" id="{09107B5E-46EE-7147-09FC-3D1A6D2CAA55}"/>
+                  </a:ext>
+                </a:extLst>
+              </p:cNvPr>
+              <p:cNvSpPr/>
+              <p:nvPr/>
+            </p:nvSpPr>
+            <p:spPr>
+              <a:xfrm>
+                <a:off x="1925053" y="4774495"/>
+                <a:ext cx="2236129" cy="1060174"/>
+              </a:xfrm>
+              <a:prstGeom prst="rect">
+                <a:avLst/>
+              </a:prstGeom>
+              <a:solidFill>
+                <a:schemeClr val="bg1"/>
+              </a:solidFill>
+              <a:ln w="28575">
+                <a:solidFill>
+                  <a:schemeClr val="tx1"/>
+                </a:solidFill>
+              </a:ln>
+            </p:spPr>
+            <p:style>
+              <a:lnRef idx="2">
+                <a:schemeClr val="accent1">
+                  <a:shade val="50000"/>
+                </a:schemeClr>
+              </a:lnRef>
+              <a:fillRef idx="1">
+                <a:schemeClr val="accent1"/>
+              </a:fillRef>
+              <a:effectRef idx="0">
+                <a:schemeClr val="accent1"/>
+              </a:effectRef>
+              <a:fontRef idx="minor">
+                <a:schemeClr val="lt1"/>
+              </a:fontRef>
+            </p:style>
+            <p:txBody>
+              <a:bodyPr rtlCol="0" anchor="ctr"/>
+              <a:lstStyle/>
+              <a:p>
+                <a:pPr algn="ctr"/>
+                <a14:m>
+                  <m:oMathPara xmlns:m="http://schemas.openxmlformats.org/officeDocument/2006/math">
+                    <m:oMathParaPr>
+                      <m:jc m:val="centerGroup"/>
+                    </m:oMathParaPr>
+                    <m:oMath xmlns:m="http://schemas.openxmlformats.org/officeDocument/2006/math">
+                      <m:r>
+                        <a:rPr lang="en-US" sz="2000" b="0" i="1" smtClean="0">
+                          <a:solidFill>
+                            <a:schemeClr val="tx1"/>
+                          </a:solidFill>
+                          <a:latin typeface="Cambria Math" panose="02040503050406030204" pitchFamily="18" charset="0"/>
+                        </a:rPr>
+                        <m:t>𝑀</m:t>
+                      </m:r>
+                      <m:d>
+                        <m:dPr>
+                          <m:ctrlPr>
+                            <a:rPr lang="en-US" sz="2000" b="0" i="1" smtClean="0">
+                              <a:solidFill>
+                                <a:schemeClr val="tx1"/>
+                              </a:solidFill>
+                              <a:latin typeface="Cambria Math" panose="02040503050406030204" pitchFamily="18" charset="0"/>
+                            </a:rPr>
+                          </m:ctrlPr>
+                        </m:dPr>
+                        <m:e>
+                          <m:r>
+                            <a:rPr lang="en-US" sz="2000" i="1">
+                              <a:solidFill>
+                                <a:schemeClr val="tx1"/>
+                              </a:solidFill>
+                              <a:latin typeface="Cambria Math" panose="02040503050406030204" pitchFamily="18" charset="0"/>
+                            </a:rPr>
+                            <m:t>𝜎</m:t>
+                          </m:r>
+                        </m:e>
+                      </m:d>
+                      <m:r>
+                        <a:rPr lang="en-US" sz="2000" b="0" i="1" smtClean="0">
+                          <a:solidFill>
+                            <a:schemeClr val="tx1"/>
+                          </a:solidFill>
+                          <a:latin typeface="Cambria Math" panose="02040503050406030204" pitchFamily="18" charset="0"/>
+                        </a:rPr>
+                        <m:t>⊨</m:t>
+                      </m:r>
+                      <m:sSub>
+                        <m:sSubPr>
+                          <m:ctrlPr>
+                            <a:rPr lang="en-US" sz="2000" b="0" i="1" smtClean="0">
+                              <a:solidFill>
+                                <a:schemeClr val="tx1"/>
+                              </a:solidFill>
+                              <a:latin typeface="Cambria Math" panose="02040503050406030204" pitchFamily="18" charset="0"/>
+                            </a:rPr>
+                          </m:ctrlPr>
+                        </m:sSubPr>
+                        <m:e>
+                          <m:r>
+                            <a:rPr lang="en-US" sz="2000" b="0" i="1" smtClean="0">
+                              <a:solidFill>
+                                <a:schemeClr val="tx1"/>
+                              </a:solidFill>
+                              <a:latin typeface="Cambria Math" panose="02040503050406030204" pitchFamily="18" charset="0"/>
+                            </a:rPr>
+                            <m:t>𝐶</m:t>
+                          </m:r>
+                        </m:e>
+                        <m:sub>
+                          <m:r>
+                            <a:rPr lang="en-US" sz="2000" b="0" i="1" smtClean="0">
+                              <a:solidFill>
+                                <a:schemeClr val="tx1"/>
+                              </a:solidFill>
+                              <a:latin typeface="Cambria Math" panose="02040503050406030204" pitchFamily="18" charset="0"/>
+                            </a:rPr>
+                            <m:t>1</m:t>
+                          </m:r>
+                        </m:sub>
+                      </m:sSub>
+                      <m:d>
+                        <m:dPr>
+                          <m:ctrlPr>
+                            <a:rPr lang="en-US" sz="2000" b="0" i="1" smtClean="0">
+                              <a:solidFill>
+                                <a:schemeClr val="tx1"/>
+                              </a:solidFill>
+                              <a:latin typeface="Cambria Math" panose="02040503050406030204" pitchFamily="18" charset="0"/>
+                            </a:rPr>
+                          </m:ctrlPr>
+                        </m:dPr>
+                        <m:e>
+                          <m:r>
+                            <a:rPr lang="en-US" sz="2000" b="0" i="1" smtClean="0">
+                              <a:solidFill>
+                                <a:schemeClr val="tx1"/>
+                              </a:solidFill>
+                              <a:latin typeface="Cambria Math" panose="02040503050406030204" pitchFamily="18" charset="0"/>
+                            </a:rPr>
+                            <m:t>𝑐</m:t>
+                          </m:r>
+                        </m:e>
+                      </m:d>
+                    </m:oMath>
+                  </m:oMathPara>
+                </a14:m>
+                <a:endParaRPr lang="en-US" sz="2000" dirty="0"/>
+              </a:p>
+            </p:txBody>
+          </p:sp>
+        </mc:Choice>
+        <mc:Fallback>
+          <p:sp>
+            <p:nvSpPr>
+              <p:cNvPr id="27" name="Rectangle 26">
+                <a:extLst>
+                  <a:ext uri="{FF2B5EF4-FFF2-40B4-BE49-F238E27FC236}">
+                    <a16:creationId xmlns:a16="http://schemas.microsoft.com/office/drawing/2014/main" id="{09107B5E-46EE-7147-09FC-3D1A6D2CAA55}"/>
+                  </a:ext>
+                </a:extLst>
+              </p:cNvPr>
+              <p:cNvSpPr>
+                <a:spLocks noRot="1" noChangeAspect="1" noMove="1" noResize="1" noEditPoints="1" noAdjustHandles="1" noChangeArrowheads="1" noChangeShapeType="1" noTextEdit="1"/>
+              </p:cNvSpPr>
+              <p:nvPr/>
+            </p:nvSpPr>
+            <p:spPr>
+              <a:xfrm>
+                <a:off x="1925053" y="4774495"/>
+                <a:ext cx="2236129" cy="1060174"/>
+              </a:xfrm>
+              <a:prstGeom prst="rect">
+                <a:avLst/>
+              </a:prstGeom>
+              <a:blipFill>
+                <a:blip r:embed="rId7"/>
+                <a:stretch>
+                  <a:fillRect/>
+                </a:stretch>
+              </a:blipFill>
+              <a:ln w="28575">
+                <a:solidFill>
+                  <a:schemeClr val="tx1"/>
+                </a:solidFill>
+              </a:ln>
+            </p:spPr>
+            <p:txBody>
+              <a:bodyPr/>
+              <a:lstStyle/>
+              <a:p>
+                <a:r>
+                  <a:rPr lang="en-US">
+                    <a:noFill/>
+                  </a:rPr>
+                  <a:t> </a:t>
+                </a:r>
+              </a:p>
+            </p:txBody>
+          </p:sp>
+        </mc:Fallback>
+      </mc:AlternateContent>
+      <mc:AlternateContent xmlns:mc="http://schemas.openxmlformats.org/markup-compatibility/2006">
+        <mc:Choice xmlns:a14="http://schemas.microsoft.com/office/drawing/2010/main" Requires="a14">
+          <p:sp>
+            <p:nvSpPr>
+              <p:cNvPr id="28" name="TextBox 27">
+                <a:extLst>
+                  <a:ext uri="{FF2B5EF4-FFF2-40B4-BE49-F238E27FC236}">
+                    <a16:creationId xmlns:a16="http://schemas.microsoft.com/office/drawing/2014/main" id="{DE94CFC7-C9EA-3FF5-2C23-B4D4DBA2C303}"/>
+                  </a:ext>
+                </a:extLst>
+              </p:cNvPr>
+              <p:cNvSpPr txBox="1"/>
+              <p:nvPr/>
+            </p:nvSpPr>
+            <p:spPr>
+              <a:xfrm>
+                <a:off x="1647967" y="3999671"/>
+                <a:ext cx="2790301" cy="461665"/>
+              </a:xfrm>
+              <a:prstGeom prst="rect">
+                <a:avLst/>
+              </a:prstGeom>
+              <a:noFill/>
+            </p:spPr>
+            <p:txBody>
+              <a:bodyPr wrap="square">
+                <a:spAutoFit/>
+              </a:bodyPr>
+              <a:lstStyle/>
+              <a:p>
+                <a:pPr/>
+                <a14:m>
+                  <m:oMathPara xmlns:m="http://schemas.openxmlformats.org/officeDocument/2006/math">
+                    <m:oMathParaPr>
+                      <m:jc m:val="centerGroup"/>
+                    </m:oMathParaPr>
+                    <m:oMath xmlns:m="http://schemas.openxmlformats.org/officeDocument/2006/math">
+                      <m:r>
+                        <a:rPr lang="en-US" sz="2400" b="0" i="1" smtClean="0">
+                          <a:solidFill>
+                            <a:schemeClr val="tx1"/>
+                          </a:solidFill>
+                          <a:latin typeface="Cambria Math" panose="02040503050406030204" pitchFamily="18" charset="0"/>
+                        </a:rPr>
+                        <m:t>𝑤</m:t>
+                      </m:r>
+                      <m:r>
+                        <a:rPr lang="en-US" sz="2400" b="0" i="1" smtClean="0">
+                          <a:solidFill>
+                            <a:schemeClr val="tx1"/>
+                          </a:solidFill>
+                          <a:latin typeface="Cambria Math" panose="02040503050406030204" pitchFamily="18" charset="0"/>
+                        </a:rPr>
+                        <m:t>~</m:t>
+                      </m:r>
+                      <m:r>
+                        <a:rPr lang="en-US" sz="2400" b="0" i="1" smtClean="0">
+                          <a:solidFill>
+                            <a:schemeClr val="tx1"/>
+                          </a:solidFill>
+                          <a:latin typeface="Cambria Math" panose="02040503050406030204" pitchFamily="18" charset="0"/>
+                        </a:rPr>
+                        <m:t>𝐺𝑎𝑢𝑠𝑠𝑖𝑎𝑛</m:t>
+                      </m:r>
+                      <m:r>
+                        <a:rPr lang="en-US" sz="2400" b="0" i="1" smtClean="0">
+                          <a:solidFill>
+                            <a:schemeClr val="tx1"/>
+                          </a:solidFill>
+                          <a:latin typeface="Cambria Math" panose="02040503050406030204" pitchFamily="18" charset="0"/>
+                        </a:rPr>
+                        <m:t> </m:t>
+                      </m:r>
+                      <m:d>
+                        <m:dPr>
+                          <m:ctrlPr>
+                            <a:rPr lang="en-US" sz="2400" b="0" i="1" smtClean="0">
+                              <a:solidFill>
+                                <a:schemeClr val="tx1"/>
+                              </a:solidFill>
+                              <a:latin typeface="Cambria Math" panose="02040503050406030204" pitchFamily="18" charset="0"/>
+                            </a:rPr>
+                          </m:ctrlPr>
+                        </m:dPr>
+                        <m:e>
+                          <m:sSup>
+                            <m:sSupPr>
+                              <m:ctrlPr>
+                                <a:rPr lang="en-US" sz="2400" b="0" i="1" smtClean="0">
+                                  <a:solidFill>
+                                    <a:schemeClr val="tx1"/>
+                                  </a:solidFill>
+                                  <a:latin typeface="Cambria Math" panose="02040503050406030204" pitchFamily="18" charset="0"/>
+                                </a:rPr>
+                              </m:ctrlPr>
+                            </m:sSupPr>
+                            <m:e>
+                              <m:r>
+                                <a:rPr lang="en-US" sz="2400" b="0" i="1" smtClean="0">
+                                  <a:solidFill>
+                                    <a:schemeClr val="tx1"/>
+                                  </a:solidFill>
+                                  <a:latin typeface="Cambria Math" panose="02040503050406030204" pitchFamily="18" charset="0"/>
+                                </a:rPr>
+                                <m:t>0,</m:t>
+                              </m:r>
+                              <m:r>
+                                <a:rPr lang="en-US" sz="2400" b="0" i="1" smtClean="0">
+                                  <a:solidFill>
+                                    <a:schemeClr val="tx1"/>
+                                  </a:solidFill>
+                                  <a:latin typeface="Cambria Math" panose="02040503050406030204" pitchFamily="18" charset="0"/>
+                                </a:rPr>
+                                <m:t>𝜎</m:t>
+                              </m:r>
+                            </m:e>
+                            <m:sup>
+                              <m:r>
+                                <a:rPr lang="en-US" sz="2400" b="0" i="1" smtClean="0">
+                                  <a:solidFill>
+                                    <a:schemeClr val="tx1"/>
+                                  </a:solidFill>
+                                  <a:latin typeface="Cambria Math" panose="02040503050406030204" pitchFamily="18" charset="0"/>
+                                </a:rPr>
+                                <m:t>2</m:t>
+                              </m:r>
+                            </m:sup>
+                          </m:sSup>
+                        </m:e>
+                      </m:d>
+                    </m:oMath>
+                  </m:oMathPara>
+                </a14:m>
+                <a:endParaRPr lang="en-US" sz="2400" dirty="0"/>
+              </a:p>
+            </p:txBody>
+          </p:sp>
+        </mc:Choice>
+        <mc:Fallback>
+          <p:sp>
+            <p:nvSpPr>
+              <p:cNvPr id="28" name="TextBox 27">
+                <a:extLst>
+                  <a:ext uri="{FF2B5EF4-FFF2-40B4-BE49-F238E27FC236}">
+                    <a16:creationId xmlns:a16="http://schemas.microsoft.com/office/drawing/2014/main" id="{DE94CFC7-C9EA-3FF5-2C23-B4D4DBA2C303}"/>
+                  </a:ext>
+                </a:extLst>
+              </p:cNvPr>
+              <p:cNvSpPr txBox="1">
+                <a:spLocks noRot="1" noChangeAspect="1" noMove="1" noResize="1" noEditPoints="1" noAdjustHandles="1" noChangeArrowheads="1" noChangeShapeType="1" noTextEdit="1"/>
+              </p:cNvSpPr>
+              <p:nvPr/>
+            </p:nvSpPr>
+            <p:spPr>
+              <a:xfrm>
+                <a:off x="1647967" y="3999671"/>
+                <a:ext cx="2790301" cy="461665"/>
+              </a:xfrm>
+              <a:prstGeom prst="rect">
+                <a:avLst/>
+              </a:prstGeom>
+              <a:blipFill>
+                <a:blip r:embed="rId8"/>
+                <a:stretch>
+                  <a:fillRect/>
+                </a:stretch>
+              </a:blipFill>
+            </p:spPr>
+            <p:txBody>
+              <a:bodyPr/>
+              <a:lstStyle/>
+              <a:p>
+                <a:r>
+                  <a:rPr lang="en-US">
+                    <a:noFill/>
+                  </a:rPr>
+                  <a:t> </a:t>
+                </a:r>
+              </a:p>
+            </p:txBody>
+          </p:sp>
+        </mc:Fallback>
+      </mc:AlternateContent>
+      <p:cxnSp>
+        <p:nvCxnSpPr>
+          <p:cNvPr id="29" name="Straight Arrow Connector 28">
+            <a:extLst>
+              <a:ext uri="{FF2B5EF4-FFF2-40B4-BE49-F238E27FC236}">
+                <a16:creationId xmlns:a16="http://schemas.microsoft.com/office/drawing/2014/main" id="{EBD78814-873B-B925-6E8A-DF0E82272659}"/>
+              </a:ext>
+            </a:extLst>
+          </p:cNvPr>
+          <p:cNvCxnSpPr>
+            <a:cxnSpLocks/>
+            <a:stCxn id="28" idx="2"/>
+            <a:endCxn id="27" idx="0"/>
+          </p:cNvCxnSpPr>
+          <p:nvPr/>
+        </p:nvCxnSpPr>
+        <p:spPr>
+          <a:xfrm>
+            <a:off x="3043118" y="4461336"/>
+            <a:ext cx="0" cy="313159"/>
+          </a:xfrm>
+          <a:prstGeom prst="straightConnector1">
+            <a:avLst/>
+          </a:prstGeom>
+          <a:ln>
+            <a:solidFill>
+              <a:schemeClr val="tx1"/>
+            </a:solidFill>
+            <a:prstDash val="lgDash"/>
+            <a:tailEnd type="triangle"/>
+          </a:ln>
+        </p:spPr>
+        <p:style>
+          <a:lnRef idx="1">
+            <a:schemeClr val="accent1"/>
+          </a:lnRef>
+          <a:fillRef idx="0">
+            <a:schemeClr val="accent1"/>
+          </a:fillRef>
+          <a:effectRef idx="0">
+            <a:schemeClr val="accent1"/>
+          </a:effectRef>
+          <a:fontRef idx="minor">
+            <a:schemeClr val="tx1"/>
+          </a:fontRef>
+        </p:style>
+      </p:cxnSp>
+      <p:cxnSp>
+        <p:nvCxnSpPr>
+          <p:cNvPr id="30" name="Connector: Elbow 29">
+            <a:extLst>
+              <a:ext uri="{FF2B5EF4-FFF2-40B4-BE49-F238E27FC236}">
+                <a16:creationId xmlns:a16="http://schemas.microsoft.com/office/drawing/2014/main" id="{8955B4D5-F562-6BC9-EA84-2A6ED8C592F3}"/>
+              </a:ext>
+            </a:extLst>
+          </p:cNvPr>
+          <p:cNvCxnSpPr>
+            <a:stCxn id="28" idx="3"/>
+            <a:endCxn id="26" idx="0"/>
+          </p:cNvCxnSpPr>
+          <p:nvPr/>
+        </p:nvCxnSpPr>
+        <p:spPr>
+          <a:xfrm>
+            <a:off x="4438268" y="4230504"/>
+            <a:ext cx="1580600" cy="543991"/>
+          </a:xfrm>
+          <a:prstGeom prst="bentConnector2">
+            <a:avLst/>
+          </a:prstGeom>
+          <a:ln>
+            <a:solidFill>
+              <a:schemeClr val="tx1"/>
+            </a:solidFill>
+            <a:prstDash val="lgDash"/>
+            <a:tailEnd type="triangle"/>
+          </a:ln>
+        </p:spPr>
+        <p:style>
+          <a:lnRef idx="1">
+            <a:schemeClr val="accent1"/>
+          </a:lnRef>
+          <a:fillRef idx="0">
+            <a:schemeClr val="accent1"/>
+          </a:fillRef>
+          <a:effectRef idx="0">
+            <a:schemeClr val="accent1"/>
+          </a:effectRef>
+          <a:fontRef idx="minor">
+            <a:schemeClr val="tx1"/>
+          </a:fontRef>
+        </p:style>
+      </p:cxnSp>
+    </p:spTree>
+    <p:extLst>
+      <p:ext uri="{BB962C8B-B14F-4D97-AF65-F5344CB8AC3E}">
+        <p14:creationId xmlns:p14="http://schemas.microsoft.com/office/powerpoint/2010/main" val="2345169072"/>
+      </p:ext>
+    </p:extLst>
+  </p:cSld>
+  <p:clrMapOvr>
+    <a:masterClrMapping/>
+  </p:clrMapOvr>
+</p:sld>
+</file>
+
+<file path=ppt/slides/slide4.xml><?xml version="1.0" encoding="utf-8"?>
 <p:sld xmlns:a="http://schemas.openxmlformats.org/drawingml/2006/main" xmlns:r="http://schemas.openxmlformats.org/officeDocument/2006/relationships" xmlns:p="http://schemas.openxmlformats.org/presentationml/2006/main">
   <p:cSld>
     <p:spTree>
@@ -8647,7 +11255,7 @@
 </p:sld>
 </file>
 
-<file path=ppt/slides/slide3.xml><?xml version="1.0" encoding="utf-8"?>
+<file path=ppt/slides/slide5.xml><?xml version="1.0" encoding="utf-8"?>
 <p:sld xmlns:a="http://schemas.openxmlformats.org/drawingml/2006/main" xmlns:r="http://schemas.openxmlformats.org/officeDocument/2006/relationships" xmlns:p="http://schemas.openxmlformats.org/presentationml/2006/main">
   <p:cSld>
     <p:spTree>
@@ -13088,7 +15696,7 @@
 </p:sld>
 </file>
 
-<file path=ppt/slides/slide4.xml><?xml version="1.0" encoding="utf-8"?>
+<file path=ppt/slides/slide6.xml><?xml version="1.0" encoding="utf-8"?>
 <p:sld xmlns:a="http://schemas.openxmlformats.org/drawingml/2006/main" xmlns:r="http://schemas.openxmlformats.org/officeDocument/2006/relationships" xmlns:p="http://schemas.openxmlformats.org/presentationml/2006/main">
   <p:cSld>
     <p:spTree>

</xml_diff>